<commit_message>
Minor changes on readme
</commit_message>
<xml_diff>
--- a/presentation/US_News_and_reports_2016_colleges.pptx
+++ b/presentation/US_News_and_reports_2016_colleges.pptx
@@ -21,17 +21,16 @@
     <p:sldId id="275" r:id="rId15"/>
     <p:sldId id="285" r:id="rId16"/>
     <p:sldId id="286" r:id="rId17"/>
-    <p:sldId id="287" r:id="rId18"/>
-    <p:sldId id="284" r:id="rId19"/>
-    <p:sldId id="269" r:id="rId20"/>
-    <p:sldId id="270" r:id="rId21"/>
-    <p:sldId id="271" r:id="rId22"/>
-    <p:sldId id="272" r:id="rId23"/>
-    <p:sldId id="276" r:id="rId24"/>
-    <p:sldId id="288" r:id="rId25"/>
-    <p:sldId id="277" r:id="rId26"/>
-    <p:sldId id="279" r:id="rId27"/>
-    <p:sldId id="278" r:id="rId28"/>
+    <p:sldId id="284" r:id="rId18"/>
+    <p:sldId id="269" r:id="rId19"/>
+    <p:sldId id="270" r:id="rId20"/>
+    <p:sldId id="271" r:id="rId21"/>
+    <p:sldId id="272" r:id="rId22"/>
+    <p:sldId id="276" r:id="rId23"/>
+    <p:sldId id="288" r:id="rId24"/>
+    <p:sldId id="277" r:id="rId25"/>
+    <p:sldId id="279" r:id="rId26"/>
+    <p:sldId id="278" r:id="rId27"/>
   </p:sldIdLst>
   <p:sldSz cx="12192000" cy="6858000"/>
   <p:notesSz cx="6858000" cy="9144000"/>
@@ -296,7 +295,7 @@
           <a:p>
             <a:fld id="{E38738C5-85BB-284F-A430-60E469E42B4C}" type="datetimeFigureOut">
               <a:rPr lang="en-US" smtClean="0"/>
-              <a:t>11/2/23</a:t>
+              <a:t>11/14/23</a:t>
             </a:fld>
             <a:endParaRPr lang="en-US"/>
           </a:p>
@@ -494,7 +493,7 @@
           <a:p>
             <a:fld id="{E38738C5-85BB-284F-A430-60E469E42B4C}" type="datetimeFigureOut">
               <a:rPr lang="en-US" smtClean="0"/>
-              <a:t>11/2/23</a:t>
+              <a:t>11/14/23</a:t>
             </a:fld>
             <a:endParaRPr lang="en-US"/>
           </a:p>
@@ -702,7 +701,7 @@
           <a:p>
             <a:fld id="{E38738C5-85BB-284F-A430-60E469E42B4C}" type="datetimeFigureOut">
               <a:rPr lang="en-US" smtClean="0"/>
-              <a:t>11/2/23</a:t>
+              <a:t>11/14/23</a:t>
             </a:fld>
             <a:endParaRPr lang="en-US"/>
           </a:p>
@@ -900,7 +899,7 @@
           <a:p>
             <a:fld id="{E38738C5-85BB-284F-A430-60E469E42B4C}" type="datetimeFigureOut">
               <a:rPr lang="en-US" smtClean="0"/>
-              <a:t>11/2/23</a:t>
+              <a:t>11/14/23</a:t>
             </a:fld>
             <a:endParaRPr lang="en-US"/>
           </a:p>
@@ -1175,7 +1174,7 @@
           <a:p>
             <a:fld id="{E38738C5-85BB-284F-A430-60E469E42B4C}" type="datetimeFigureOut">
               <a:rPr lang="en-US" smtClean="0"/>
-              <a:t>11/2/23</a:t>
+              <a:t>11/14/23</a:t>
             </a:fld>
             <a:endParaRPr lang="en-US"/>
           </a:p>
@@ -1440,7 +1439,7 @@
           <a:p>
             <a:fld id="{E38738C5-85BB-284F-A430-60E469E42B4C}" type="datetimeFigureOut">
               <a:rPr lang="en-US" smtClean="0"/>
-              <a:t>11/2/23</a:t>
+              <a:t>11/14/23</a:t>
             </a:fld>
             <a:endParaRPr lang="en-US"/>
           </a:p>
@@ -1852,7 +1851,7 @@
           <a:p>
             <a:fld id="{E38738C5-85BB-284F-A430-60E469E42B4C}" type="datetimeFigureOut">
               <a:rPr lang="en-US" smtClean="0"/>
-              <a:t>11/2/23</a:t>
+              <a:t>11/14/23</a:t>
             </a:fld>
             <a:endParaRPr lang="en-US"/>
           </a:p>
@@ -1993,7 +1992,7 @@
           <a:p>
             <a:fld id="{E38738C5-85BB-284F-A430-60E469E42B4C}" type="datetimeFigureOut">
               <a:rPr lang="en-US" smtClean="0"/>
-              <a:t>11/2/23</a:t>
+              <a:t>11/14/23</a:t>
             </a:fld>
             <a:endParaRPr lang="en-US"/>
           </a:p>
@@ -2106,7 +2105,7 @@
           <a:p>
             <a:fld id="{E38738C5-85BB-284F-A430-60E469E42B4C}" type="datetimeFigureOut">
               <a:rPr lang="en-US" smtClean="0"/>
-              <a:t>11/2/23</a:t>
+              <a:t>11/14/23</a:t>
             </a:fld>
             <a:endParaRPr lang="en-US"/>
           </a:p>
@@ -2417,7 +2416,7 @@
           <a:p>
             <a:fld id="{E38738C5-85BB-284F-A430-60E469E42B4C}" type="datetimeFigureOut">
               <a:rPr lang="en-US" smtClean="0"/>
-              <a:t>11/2/23</a:t>
+              <a:t>11/14/23</a:t>
             </a:fld>
             <a:endParaRPr lang="en-US"/>
           </a:p>
@@ -2705,7 +2704,7 @@
           <a:p>
             <a:fld id="{E38738C5-85BB-284F-A430-60E469E42B4C}" type="datetimeFigureOut">
               <a:rPr lang="en-US" smtClean="0"/>
-              <a:t>11/2/23</a:t>
+              <a:t>11/14/23</a:t>
             </a:fld>
             <a:endParaRPr lang="en-US"/>
           </a:p>
@@ -2946,7 +2945,7 @@
           <a:p>
             <a:fld id="{E38738C5-85BB-284F-A430-60E469E42B4C}" type="datetimeFigureOut">
               <a:rPr lang="en-US" smtClean="0"/>
-              <a:t>11/2/23</a:t>
+              <a:t>11/14/23</a:t>
             </a:fld>
             <a:endParaRPr lang="en-US"/>
           </a:p>
@@ -5222,7 +5221,7 @@
           <p:cNvPr id="2" name="Title 1">
             <a:extLst>
               <a:ext uri="{FF2B5EF4-FFF2-40B4-BE49-F238E27FC236}">
-                <a16:creationId xmlns:a16="http://schemas.microsoft.com/office/drawing/2014/main" id="{92BCD8FB-ACEC-60EB-DDB2-7BD4B836373E}"/>
+                <a16:creationId xmlns:a16="http://schemas.microsoft.com/office/drawing/2014/main" id="{C7B7054B-48B2-CF3E-773F-785FEFD68529}"/>
               </a:ext>
             </a:extLst>
           </p:cNvPr>
@@ -5235,8 +5234,8 @@
         </p:nvSpPr>
         <p:spPr>
           <a:xfrm>
-            <a:off x="696798" y="-153349"/>
-            <a:ext cx="10515600" cy="1325563"/>
+            <a:off x="38154" y="0"/>
+            <a:ext cx="12192001" cy="1325563"/>
           </a:xfrm>
         </p:spPr>
         <p:txBody>
@@ -5249,196 +5248,49 @@
                   <a:srgbClr val="701F57"/>
                 </a:solidFill>
               </a:rPr>
-              <a:t>Cost: Out-State Tuition</a:t>
-            </a:r>
-          </a:p>
-        </p:txBody>
-      </p:sp>
-      <p:sp>
-        <p:nvSpPr>
-          <p:cNvPr id="3" name="Content Placeholder 2">
-            <a:extLst>
-              <a:ext uri="{FF2B5EF4-FFF2-40B4-BE49-F238E27FC236}">
-                <a16:creationId xmlns:a16="http://schemas.microsoft.com/office/drawing/2014/main" id="{F09FDA0B-26DB-130B-CE20-A35E5D845E80}"/>
-              </a:ext>
-            </a:extLst>
-          </p:cNvPr>
-          <p:cNvSpPr>
-            <a:spLocks noGrp="1"/>
-          </p:cNvSpPr>
+              <a:t>Public to Public</a:t>
+            </a:r>
+            <a:br>
+              <a:rPr lang="en-US" dirty="0">
+                <a:solidFill>
+                  <a:srgbClr val="701F57"/>
+                </a:solidFill>
+              </a:rPr>
+            </a:br>
+            <a:r>
+              <a:rPr lang="en-US" dirty="0">
+                <a:solidFill>
+                  <a:srgbClr val="701F57"/>
+                </a:solidFill>
+              </a:rPr>
+              <a:t>	</a:t>
+            </a:r>
+            <a:r>
+              <a:rPr lang="en-US" sz="3600" dirty="0">
+                <a:solidFill>
+                  <a:srgbClr val="701F57"/>
+                </a:solidFill>
+              </a:rPr>
+              <a:t>Regions Charge Differently for In and Out of State</a:t>
+            </a:r>
+          </a:p>
+        </p:txBody>
+      </p:sp>
+      <p:pic>
+        <p:nvPicPr>
+          <p:cNvPr id="9" name="Content Placeholder 8" descr="A graph of average cost of cost&#10;&#10;Description automatically generated">
+            <a:extLst>
+              <a:ext uri="{FF2B5EF4-FFF2-40B4-BE49-F238E27FC236}">
+                <a16:creationId xmlns:a16="http://schemas.microsoft.com/office/drawing/2014/main" id="{92E3A0AB-A37E-7F0E-74A7-E0960D13B3B2}"/>
+              </a:ext>
+            </a:extLst>
+          </p:cNvPr>
+          <p:cNvPicPr>
+            <a:picLocks noGrp="1" noChangeAspect="1"/>
+          </p:cNvPicPr>
           <p:nvPr>
             <p:ph idx="1"/>
           </p:nvPr>
-        </p:nvSpPr>
-        <p:spPr>
-          <a:xfrm>
-            <a:off x="8342723" y="647274"/>
-            <a:ext cx="3849277" cy="2689814"/>
-          </a:xfrm>
-        </p:spPr>
-        <p:txBody>
-          <a:bodyPr>
-            <a:normAutofit/>
-          </a:bodyPr>
-          <a:lstStyle/>
-          <a:p>
-            <a:pPr marL="0" indent="0" algn="ctr">
-              <a:buNone/>
-            </a:pPr>
-            <a:r>
-              <a:rPr lang="en-CA" sz="3600" b="0" i="0" dirty="0">
-                <a:solidFill>
-                  <a:srgbClr val="701F57"/>
-                </a:solidFill>
-                <a:effectLst/>
-                <a:latin typeface="Menlo" panose="020B0609030804020204" pitchFamily="49" charset="0"/>
-              </a:rPr>
-              <a:t>6152</a:t>
-            </a:r>
-            <a:r>
-              <a:rPr lang="en-CA" sz="1800" b="0" i="0" dirty="0">
-                <a:solidFill>
-                  <a:srgbClr val="000000"/>
-                </a:solidFill>
-                <a:effectLst/>
-                <a:latin typeface="Menlo" panose="020B0609030804020204" pitchFamily="49" charset="0"/>
-              </a:rPr>
-              <a:t> </a:t>
-            </a:r>
-          </a:p>
-          <a:p>
-            <a:pPr marL="0" indent="0">
-              <a:buNone/>
-            </a:pPr>
-            <a:r>
-              <a:rPr lang="en-CA" sz="1600" b="0" i="0" dirty="0">
-                <a:solidFill>
-                  <a:srgbClr val="000000"/>
-                </a:solidFill>
-                <a:effectLst/>
-                <a:latin typeface="Menlo" panose="020B0609030804020204" pitchFamily="49" charset="0"/>
-              </a:rPr>
-              <a:t>Mean </a:t>
-            </a:r>
-            <a:r>
-              <a:rPr lang="en-CA" sz="1600" dirty="0">
-                <a:solidFill>
-                  <a:srgbClr val="000000"/>
-                </a:solidFill>
-                <a:latin typeface="Menlo" panose="020B0609030804020204" pitchFamily="49" charset="0"/>
-              </a:rPr>
-              <a:t>Out-of-</a:t>
-            </a:r>
-            <a:r>
-              <a:rPr lang="en-CA" sz="1600" b="0" i="0" dirty="0">
-                <a:solidFill>
-                  <a:srgbClr val="000000"/>
-                </a:solidFill>
-                <a:effectLst/>
-                <a:latin typeface="Menlo" panose="020B0609030804020204" pitchFamily="49" charset="0"/>
-              </a:rPr>
-              <a:t>State Tuition for Public. </a:t>
-            </a:r>
-          </a:p>
-          <a:p>
-            <a:pPr marL="0" indent="0" algn="ctr">
-              <a:buNone/>
-            </a:pPr>
-            <a:r>
-              <a:rPr lang="en-CA" sz="3600" b="0" i="0" dirty="0">
-                <a:solidFill>
-                  <a:srgbClr val="35193E"/>
-                </a:solidFill>
-                <a:effectLst/>
-                <a:latin typeface="Menlo" panose="020B0609030804020204" pitchFamily="49" charset="0"/>
-              </a:rPr>
-              <a:t>11008</a:t>
-            </a:r>
-            <a:endParaRPr lang="en-CA" sz="3600" b="0" i="0" dirty="0">
-              <a:solidFill>
-                <a:srgbClr val="000000"/>
-              </a:solidFill>
-              <a:effectLst/>
-              <a:latin typeface="Menlo" panose="020B0609030804020204" pitchFamily="49" charset="0"/>
-            </a:endParaRPr>
-          </a:p>
-          <a:p>
-            <a:pPr marL="0" indent="0">
-              <a:buNone/>
-            </a:pPr>
-            <a:r>
-              <a:rPr lang="en-CA" sz="1600" dirty="0">
-                <a:solidFill>
-                  <a:srgbClr val="000000"/>
-                </a:solidFill>
-                <a:latin typeface="Menlo" panose="020B0609030804020204" pitchFamily="49" charset="0"/>
-              </a:rPr>
-              <a:t>Mean for Out-of-State Tuition for Private Schools</a:t>
-            </a:r>
-            <a:br>
-              <a:rPr lang="en-CA" sz="1600" dirty="0">
-                <a:solidFill>
-                  <a:srgbClr val="000000"/>
-                </a:solidFill>
-                <a:latin typeface="Menlo" panose="020B0609030804020204" pitchFamily="49" charset="0"/>
-              </a:rPr>
-            </a:br>
-            <a:r>
-              <a:rPr lang="en-CA" sz="1000" dirty="0">
-                <a:solidFill>
-                  <a:srgbClr val="000000"/>
-                </a:solidFill>
-                <a:latin typeface="Menlo" panose="020B0609030804020204" pitchFamily="49" charset="0"/>
-              </a:rPr>
-              <a:t>(2-tailed </a:t>
-            </a:r>
-            <a:r>
-              <a:rPr lang="en-CA" sz="1000" dirty="0" err="1">
-                <a:solidFill>
-                  <a:srgbClr val="000000"/>
-                </a:solidFill>
-                <a:latin typeface="Menlo" panose="020B0609030804020204" pitchFamily="49" charset="0"/>
-              </a:rPr>
-              <a:t>ttest</a:t>
-            </a:r>
-            <a:r>
-              <a:rPr lang="en-CA" sz="1000" dirty="0">
-                <a:solidFill>
-                  <a:srgbClr val="000000"/>
-                </a:solidFill>
-                <a:latin typeface="Menlo" panose="020B0609030804020204" pitchFamily="49" charset="0"/>
-              </a:rPr>
-              <a:t> p-value = 0.0, Statistic=58.6)</a:t>
-            </a:r>
-            <a:r>
-              <a:rPr lang="en-CA" sz="1000" b="0" i="0" dirty="0">
-                <a:solidFill>
-                  <a:srgbClr val="000000"/>
-                </a:solidFill>
-                <a:effectLst/>
-                <a:latin typeface="Menlo" panose="020B0609030804020204" pitchFamily="49" charset="0"/>
-              </a:rPr>
-              <a:t> </a:t>
-            </a:r>
-          </a:p>
-          <a:p>
-            <a:endParaRPr lang="en-US" dirty="0"/>
-          </a:p>
-        </p:txBody>
-      </p:sp>
-      <p:pic>
-        <p:nvPicPr>
-          <p:cNvPr id="11" name="Picture 10" descr="A graph of a graph of a number of people&#10;&#10;Description automatically generated with medium confidence">
-            <a:extLst>
-              <a:ext uri="{FF2B5EF4-FFF2-40B4-BE49-F238E27FC236}">
-                <a16:creationId xmlns:a16="http://schemas.microsoft.com/office/drawing/2014/main" id="{EB844E8D-2B4E-A339-BC45-C90CA3878FC8}"/>
-              </a:ext>
-            </a:extLst>
-          </p:cNvPr>
-          <p:cNvPicPr>
-            <a:picLocks noChangeAspect="1"/>
-          </p:cNvPicPr>
-          <p:nvPr/>
         </p:nvPicPr>
         <p:blipFill>
           <a:blip r:embed="rId2"/>
@@ -5448,20 +5300,17 @@
         </p:blipFill>
         <p:spPr>
           <a:xfrm>
-            <a:off x="66916" y="936544"/>
-            <a:ext cx="8275807" cy="5549096"/>
-          </a:xfrm>
-          <a:prstGeom prst="rect">
-            <a:avLst/>
-          </a:prstGeom>
+            <a:off x="6134155" y="1686887"/>
+            <a:ext cx="6057845" cy="4630024"/>
+          </a:xfrm>
         </p:spPr>
       </p:pic>
       <p:pic>
         <p:nvPicPr>
-          <p:cNvPr id="13" name="Picture 12" descr="A screenshot of a college list&#10;&#10;Description automatically generated">
-            <a:extLst>
-              <a:ext uri="{FF2B5EF4-FFF2-40B4-BE49-F238E27FC236}">
-                <a16:creationId xmlns:a16="http://schemas.microsoft.com/office/drawing/2014/main" id="{B3A9F1DA-D0A9-FEC1-1A7A-52906895D44C}"/>
+          <p:cNvPr id="11" name="Picture 10" descr="A graph of average cost by region&#10;&#10;Description automatically generated">
+            <a:extLst>
+              <a:ext uri="{FF2B5EF4-FFF2-40B4-BE49-F238E27FC236}">
+                <a16:creationId xmlns:a16="http://schemas.microsoft.com/office/drawing/2014/main" id="{7B382D54-6636-C195-876A-5C22D07BAAEB}"/>
               </a:ext>
             </a:extLst>
           </p:cNvPr>
@@ -5478,8 +5327,8 @@
         </p:blipFill>
         <p:spPr>
           <a:xfrm>
-            <a:off x="8335443" y="4128876"/>
-            <a:ext cx="3612430" cy="2556623"/>
+            <a:off x="0" y="1686887"/>
+            <a:ext cx="6096000" cy="4630024"/>
           </a:xfrm>
           <a:prstGeom prst="rect">
             <a:avLst/>
@@ -5491,7 +5340,7 @@
           <p:cNvPr id="14" name="TextBox 13">
             <a:extLst>
               <a:ext uri="{FF2B5EF4-FFF2-40B4-BE49-F238E27FC236}">
-                <a16:creationId xmlns:a16="http://schemas.microsoft.com/office/drawing/2014/main" id="{99FC4F84-F38E-F6AB-D8AF-56881A6AB8B1}"/>
+                <a16:creationId xmlns:a16="http://schemas.microsoft.com/office/drawing/2014/main" id="{BB43246F-E693-F4A3-5D8F-04A3B0C23FF5}"/>
               </a:ext>
             </a:extLst>
           </p:cNvPr>
@@ -5500,8 +5349,8 @@
         </p:nvSpPr>
         <p:spPr>
           <a:xfrm>
-            <a:off x="8257880" y="3295593"/>
-            <a:ext cx="3689993" cy="830997"/>
+            <a:off x="6096000" y="6316911"/>
+            <a:ext cx="6057845" cy="861774"/>
           </a:xfrm>
           <a:prstGeom prst="rect">
             <a:avLst/>
@@ -5514,18 +5363,157 @@
           </a:bodyPr>
           <a:lstStyle/>
           <a:p>
-            <a:pPr algn="ctr"/>
-            <a:r>
-              <a:rPr lang="en-US" sz="2400" dirty="0"/>
-              <a:t>Lowest Cost for Out-of-State Colleges</a:t>
-            </a:r>
+            <a:r>
+              <a:rPr lang="en-US" sz="1600" dirty="0"/>
+              <a:t>Significant Differences Between the Average Cost  In State For Different Regions  </a:t>
+            </a:r>
+            <a:r>
+              <a:rPr lang="en-US" sz="1000" dirty="0"/>
+              <a:t>(</a:t>
+            </a:r>
+            <a:r>
+              <a:rPr lang="en-CA" sz="1000" b="0" i="0" dirty="0">
+                <a:solidFill>
+                  <a:srgbClr val="000000"/>
+                </a:solidFill>
+                <a:effectLst/>
+                <a:latin typeface="var(--notebook-cell-output-font-family)"/>
+              </a:rPr>
+              <a:t>AMOVA </a:t>
+            </a:r>
+            <a:r>
+              <a:rPr lang="en-CA" sz="1000" b="0" i="0" dirty="0" err="1">
+                <a:solidFill>
+                  <a:srgbClr val="000000"/>
+                </a:solidFill>
+                <a:effectLst/>
+                <a:latin typeface="var(--notebook-cell-output-font-family)"/>
+              </a:rPr>
+              <a:t>fvalue</a:t>
+            </a:r>
+            <a:r>
+              <a:rPr lang="en-CA" sz="1000" b="0" i="0" dirty="0">
+                <a:solidFill>
+                  <a:srgbClr val="000000"/>
+                </a:solidFill>
+                <a:effectLst/>
+                <a:latin typeface="var(--notebook-cell-output-font-family)"/>
+              </a:rPr>
+              <a:t>=18.14586886782207, </a:t>
+            </a:r>
+            <a:r>
+              <a:rPr lang="en-CA" sz="1000" b="0" i="0" dirty="0" err="1">
+                <a:solidFill>
+                  <a:srgbClr val="000000"/>
+                </a:solidFill>
+                <a:effectLst/>
+                <a:latin typeface="var(--notebook-cell-output-font-family)"/>
+              </a:rPr>
+              <a:t>pvalue</a:t>
+            </a:r>
+            <a:r>
+              <a:rPr lang="en-CA" sz="1000" b="0" i="0" dirty="0">
+                <a:solidFill>
+                  <a:srgbClr val="000000"/>
+                </a:solidFill>
+                <a:effectLst/>
+                <a:latin typeface="var(--notebook-cell-output-font-family)"/>
+              </a:rPr>
+              <a:t>=3.897390493224823e-11 )</a:t>
+            </a:r>
+          </a:p>
+          <a:p>
+            <a:endParaRPr lang="en-US" dirty="0"/>
+          </a:p>
+        </p:txBody>
+      </p:sp>
+      <p:sp>
+        <p:nvSpPr>
+          <p:cNvPr id="15" name="TextBox 14">
+            <a:extLst>
+              <a:ext uri="{FF2B5EF4-FFF2-40B4-BE49-F238E27FC236}">
+                <a16:creationId xmlns:a16="http://schemas.microsoft.com/office/drawing/2014/main" id="{19287114-0C66-9F38-DCB2-30622C6B422B}"/>
+              </a:ext>
+            </a:extLst>
+          </p:cNvPr>
+          <p:cNvSpPr txBox="1"/>
+          <p:nvPr/>
+        </p:nvSpPr>
+        <p:spPr>
+          <a:xfrm>
+            <a:off x="0" y="6316911"/>
+            <a:ext cx="6057845" cy="738664"/>
+          </a:xfrm>
+          <a:prstGeom prst="rect">
+            <a:avLst/>
+          </a:prstGeom>
+          <a:noFill/>
+        </p:spPr>
+        <p:txBody>
+          <a:bodyPr wrap="square" rtlCol="0">
+            <a:spAutoFit/>
+          </a:bodyPr>
+          <a:lstStyle/>
+          <a:p>
+            <a:r>
+              <a:rPr lang="en-US" sz="1600" dirty="0"/>
+              <a:t>Significant Differences Between the Average Cost  In State For Different Regions </a:t>
+            </a:r>
+            <a:r>
+              <a:rPr lang="en-US" sz="1000" dirty="0"/>
+              <a:t>( ANOVA </a:t>
+            </a:r>
+            <a:r>
+              <a:rPr lang="en-CA" sz="1000" b="0" i="0" dirty="0" err="1">
+                <a:solidFill>
+                  <a:srgbClr val="000000"/>
+                </a:solidFill>
+                <a:effectLst/>
+                <a:latin typeface="Menlo" panose="020B0609030804020204" pitchFamily="49" charset="0"/>
+              </a:rPr>
+              <a:t>fvalue</a:t>
+            </a:r>
+            <a:r>
+              <a:rPr lang="en-CA" sz="1000" b="0" i="0" dirty="0">
+                <a:solidFill>
+                  <a:srgbClr val="000000"/>
+                </a:solidFill>
+                <a:effectLst/>
+                <a:latin typeface="Menlo" panose="020B0609030804020204" pitchFamily="49" charset="0"/>
+              </a:rPr>
+              <a:t>=22.97054536966959, </a:t>
+            </a:r>
+            <a:r>
+              <a:rPr lang="en-CA" sz="1000" b="0" i="0" dirty="0" err="1">
+                <a:solidFill>
+                  <a:srgbClr val="000000"/>
+                </a:solidFill>
+                <a:effectLst/>
+                <a:latin typeface="Menlo" panose="020B0609030804020204" pitchFamily="49" charset="0"/>
+              </a:rPr>
+              <a:t>pvalue</a:t>
+            </a:r>
+            <a:r>
+              <a:rPr lang="en-CA" sz="1000" b="0" i="0" dirty="0">
+                <a:solidFill>
+                  <a:srgbClr val="000000"/>
+                </a:solidFill>
+                <a:effectLst/>
+                <a:latin typeface="Menlo" panose="020B0609030804020204" pitchFamily="49" charset="0"/>
+              </a:rPr>
+              <a:t>=7.732162944526283e-14)</a:t>
+            </a:r>
+            <a:br>
+              <a:rPr lang="en-CA" sz="1000" dirty="0"/>
+            </a:br>
+            <a:endParaRPr lang="en-US" sz="1000" dirty="0"/>
           </a:p>
         </p:txBody>
       </p:sp>
     </p:spTree>
     <p:extLst>
       <p:ext uri="{BB962C8B-B14F-4D97-AF65-F5344CB8AC3E}">
-        <p14:creationId xmlns:p14="http://schemas.microsoft.com/office/powerpoint/2010/main" val="2577200429"/>
+        <p14:creationId xmlns:p14="http://schemas.microsoft.com/office/powerpoint/2010/main" val="1700966129"/>
       </p:ext>
     </p:extLst>
   </p:cSld>
@@ -5557,7 +5545,7 @@
           <p:cNvPr id="2" name="Title 1">
             <a:extLst>
               <a:ext uri="{FF2B5EF4-FFF2-40B4-BE49-F238E27FC236}">
-                <a16:creationId xmlns:a16="http://schemas.microsoft.com/office/drawing/2014/main" id="{C7B7054B-48B2-CF3E-773F-785FEFD68529}"/>
+                <a16:creationId xmlns:a16="http://schemas.microsoft.com/office/drawing/2014/main" id="{F2E5C3AE-8204-1FB0-D002-BCC396DD46A4}"/>
               </a:ext>
             </a:extLst>
           </p:cNvPr>
@@ -5568,56 +5556,467 @@
             <p:ph type="title"/>
           </p:nvPr>
         </p:nvSpPr>
-        <p:spPr>
-          <a:xfrm>
-            <a:off x="38154" y="0"/>
-            <a:ext cx="12192001" cy="1325563"/>
-          </a:xfrm>
-        </p:spPr>
+        <p:spPr/>
         <p:txBody>
           <a:bodyPr/>
           <a:lstStyle/>
           <a:p>
-            <a:r>
-              <a:rPr lang="en-US" dirty="0">
-                <a:solidFill>
-                  <a:srgbClr val="701F57"/>
-                </a:solidFill>
+            <a:endParaRPr lang="en-US"/>
+          </a:p>
+        </p:txBody>
+      </p:sp>
+      <p:sp>
+        <p:nvSpPr>
+          <p:cNvPr id="3" name="TextBox 2">
+            <a:extLst>
+              <a:ext uri="{FF2B5EF4-FFF2-40B4-BE49-F238E27FC236}">
+                <a16:creationId xmlns:a16="http://schemas.microsoft.com/office/drawing/2014/main" id="{D481D90D-0225-7F4B-48DF-E5B2AFECDF05}"/>
+              </a:ext>
+            </a:extLst>
+          </p:cNvPr>
+          <p:cNvSpPr txBox="1"/>
+          <p:nvPr/>
+        </p:nvSpPr>
+        <p:spPr>
+          <a:xfrm>
+            <a:off x="8814657" y="135353"/>
+            <a:ext cx="2502608" cy="2308324"/>
+          </a:xfrm>
+          <a:prstGeom prst="rect">
+            <a:avLst/>
+          </a:prstGeom>
+          <a:noFill/>
+        </p:spPr>
+        <p:txBody>
+          <a:bodyPr wrap="none" rtlCol="0">
+            <a:spAutoFit/>
+          </a:bodyPr>
+          <a:lstStyle/>
+          <a:p>
+            <a:r>
+              <a:rPr lang="en-CA" b="1" i="0" dirty="0">
+                <a:solidFill>
+                  <a:srgbClr val="000000"/>
+                </a:solidFill>
+                <a:effectLst/>
+                <a:latin typeface="Menlo" panose="020B0609030804020204" pitchFamily="49" charset="0"/>
               </a:rPr>
-              <a:t>Public to Public</a:t>
+              <a:t>mean 	60.343023</a:t>
+            </a:r>
+          </a:p>
+          <a:p>
+            <a:r>
+              <a:rPr lang="en-CA" b="1" i="0" dirty="0">
+                <a:solidFill>
+                  <a:srgbClr val="000000"/>
+                </a:solidFill>
+                <a:effectLst/>
+                <a:latin typeface="Menlo" panose="020B0609030804020204" pitchFamily="49" charset="0"/>
+              </a:rPr>
+              <a:t>std 	18.822515</a:t>
+            </a:r>
+          </a:p>
+          <a:p>
+            <a:r>
+              <a:rPr lang="en-CA" b="1" i="0" dirty="0">
+                <a:solidFill>
+                  <a:srgbClr val="000000"/>
+                </a:solidFill>
+                <a:effectLst/>
+                <a:latin typeface="Menlo" panose="020B0609030804020204" pitchFamily="49" charset="0"/>
+              </a:rPr>
+              <a:t>min 	8.000000</a:t>
+            </a:r>
+          </a:p>
+          <a:p>
+            <a:r>
+              <a:rPr lang="en-CA" b="1" i="0" dirty="0">
+                <a:solidFill>
+                  <a:srgbClr val="000000"/>
+                </a:solidFill>
+                <a:effectLst/>
+                <a:latin typeface="Menlo" panose="020B0609030804020204" pitchFamily="49" charset="0"/>
+              </a:rPr>
+              <a:t>Max	100 </a:t>
+            </a:r>
+          </a:p>
+          <a:p>
+            <a:r>
+              <a:rPr lang="en-CA" b="1" i="0" dirty="0">
+                <a:solidFill>
+                  <a:srgbClr val="000000"/>
+                </a:solidFill>
+                <a:effectLst/>
+                <a:latin typeface="Menlo" panose="020B0609030804020204" pitchFamily="49" charset="0"/>
+              </a:rPr>
+              <a:t>25% 	47.000000 </a:t>
+            </a:r>
+          </a:p>
+          <a:p>
+            <a:r>
+              <a:rPr lang="en-CA" b="1" i="0" dirty="0">
+                <a:solidFill>
+                  <a:srgbClr val="000000"/>
+                </a:solidFill>
+                <a:effectLst/>
+                <a:latin typeface="Menlo" panose="020B0609030804020204" pitchFamily="49" charset="0"/>
+              </a:rPr>
+              <a:t>50% 	60.000000 </a:t>
+            </a:r>
+          </a:p>
+          <a:p>
+            <a:r>
+              <a:rPr lang="en-CA" b="1" i="0" dirty="0">
+                <a:solidFill>
+                  <a:srgbClr val="000000"/>
+                </a:solidFill>
+                <a:effectLst/>
+                <a:latin typeface="Menlo" panose="020B0609030804020204" pitchFamily="49" charset="0"/>
+              </a:rPr>
+              <a:t>75% 	74.000000 </a:t>
             </a:r>
             <a:br>
-              <a:rPr lang="en-US" dirty="0">
-                <a:solidFill>
-                  <a:srgbClr val="701F57"/>
-                </a:solidFill>
-              </a:rPr>
+              <a:rPr lang="en-CA" b="1" dirty="0"/>
             </a:br>
-            <a:r>
-              <a:rPr lang="en-US" dirty="0">
-                <a:solidFill>
-                  <a:srgbClr val="701F57"/>
-                </a:solidFill>
-              </a:rPr>
-              <a:t>	</a:t>
-            </a:r>
-            <a:r>
-              <a:rPr lang="en-US" sz="3600" dirty="0">
-                <a:solidFill>
-                  <a:srgbClr val="701F57"/>
-                </a:solidFill>
-              </a:rPr>
-              <a:t>Regions Charge Differently for In and Out of State</a:t>
-            </a:r>
+            <a:endParaRPr lang="en-US" b="1" dirty="0"/>
           </a:p>
         </p:txBody>
       </p:sp>
       <p:pic>
         <p:nvPicPr>
-          <p:cNvPr id="9" name="Content Placeholder 8" descr="A graph of average cost of cost&#10;&#10;Description automatically generated">
-            <a:extLst>
-              <a:ext uri="{FF2B5EF4-FFF2-40B4-BE49-F238E27FC236}">
-                <a16:creationId xmlns:a16="http://schemas.microsoft.com/office/drawing/2014/main" id="{92E3A0AB-A37E-7F0E-74A7-E0960D13B3B2}"/>
+          <p:cNvPr id="1026" name="Picture 2">
+            <a:extLst>
+              <a:ext uri="{FF2B5EF4-FFF2-40B4-BE49-F238E27FC236}">
+                <a16:creationId xmlns:a16="http://schemas.microsoft.com/office/drawing/2014/main" id="{50DD376F-0EDA-34D9-BD40-ADBF120B74B4}"/>
+              </a:ext>
+            </a:extLst>
+          </p:cNvPr>
+          <p:cNvPicPr>
+            <a:picLocks noChangeAspect="1" noChangeArrowheads="1"/>
+          </p:cNvPicPr>
+          <p:nvPr/>
+        </p:nvPicPr>
+        <p:blipFill>
+          <a:blip r:embed="rId2">
+            <a:extLst>
+              <a:ext uri="{28A0092B-C50C-407E-A947-70E740481C1C}">
+                <a14:useLocalDpi xmlns:a14="http://schemas.microsoft.com/office/drawing/2010/main" val="0"/>
+              </a:ext>
+            </a:extLst>
+          </a:blip>
+          <a:srcRect/>
+          <a:stretch>
+            <a:fillRect/>
+          </a:stretch>
+        </p:blipFill>
+        <p:spPr bwMode="auto">
+          <a:xfrm>
+            <a:off x="8946383" y="5745348"/>
+            <a:ext cx="1734815" cy="743492"/>
+          </a:xfrm>
+          <a:prstGeom prst="rect">
+            <a:avLst/>
+          </a:prstGeom>
+          <a:noFill/>
+          <a:extLst>
+            <a:ext uri="{909E8E84-426E-40DD-AFC4-6F175D3DCCD1}">
+              <a14:hiddenFill xmlns:a14="http://schemas.microsoft.com/office/drawing/2010/main">
+                <a:solidFill>
+                  <a:srgbClr val="FFFFFF"/>
+                </a:solidFill>
+              </a14:hiddenFill>
+            </a:ext>
+          </a:extLst>
+        </p:spPr>
+      </p:pic>
+      <p:sp>
+        <p:nvSpPr>
+          <p:cNvPr id="6" name="TextBox 5">
+            <a:extLst>
+              <a:ext uri="{FF2B5EF4-FFF2-40B4-BE49-F238E27FC236}">
+                <a16:creationId xmlns:a16="http://schemas.microsoft.com/office/drawing/2014/main" id="{FE6C817F-05CE-2991-E202-E174B9BB4AC5}"/>
+              </a:ext>
+            </a:extLst>
+          </p:cNvPr>
+          <p:cNvSpPr txBox="1"/>
+          <p:nvPr/>
+        </p:nvSpPr>
+        <p:spPr>
+          <a:xfrm>
+            <a:off x="7966552" y="2497093"/>
+            <a:ext cx="4225447" cy="369332"/>
+          </a:xfrm>
+          <a:prstGeom prst="rect">
+            <a:avLst/>
+          </a:prstGeom>
+          <a:noFill/>
+        </p:spPr>
+        <p:txBody>
+          <a:bodyPr wrap="square" rtlCol="0">
+            <a:spAutoFit/>
+          </a:bodyPr>
+          <a:lstStyle/>
+          <a:p>
+            <a:pPr algn="ctr"/>
+            <a:r>
+              <a:rPr lang="en-US" dirty="0"/>
+              <a:t>THE BEST AT 100% GRADUATION RATE</a:t>
+            </a:r>
+          </a:p>
+        </p:txBody>
+      </p:sp>
+      <p:sp>
+        <p:nvSpPr>
+          <p:cNvPr id="9" name="TextBox 8">
+            <a:extLst>
+              <a:ext uri="{FF2B5EF4-FFF2-40B4-BE49-F238E27FC236}">
+                <a16:creationId xmlns:a16="http://schemas.microsoft.com/office/drawing/2014/main" id="{454F0367-44F6-CAFB-D524-6ED250A2BE1C}"/>
+              </a:ext>
+            </a:extLst>
+          </p:cNvPr>
+          <p:cNvSpPr txBox="1"/>
+          <p:nvPr/>
+        </p:nvSpPr>
+        <p:spPr>
+          <a:xfrm>
+            <a:off x="7966553" y="5345286"/>
+            <a:ext cx="4225447" cy="369332"/>
+          </a:xfrm>
+          <a:prstGeom prst="rect">
+            <a:avLst/>
+          </a:prstGeom>
+          <a:noFill/>
+        </p:spPr>
+        <p:txBody>
+          <a:bodyPr wrap="square">
+            <a:spAutoFit/>
+          </a:bodyPr>
+          <a:lstStyle/>
+          <a:p>
+            <a:pPr algn="ctr"/>
+            <a:r>
+              <a:rPr lang="en-US" dirty="0"/>
+              <a:t>THE WORST AT 8% GRADUATION RATE</a:t>
+            </a:r>
+          </a:p>
+        </p:txBody>
+      </p:sp>
+      <p:sp>
+        <p:nvSpPr>
+          <p:cNvPr id="11" name="TextBox 10">
+            <a:extLst>
+              <a:ext uri="{FF2B5EF4-FFF2-40B4-BE49-F238E27FC236}">
+                <a16:creationId xmlns:a16="http://schemas.microsoft.com/office/drawing/2014/main" id="{B9201EA1-345A-04F8-BCAD-E430B5320476}"/>
+              </a:ext>
+            </a:extLst>
+          </p:cNvPr>
+          <p:cNvSpPr txBox="1"/>
+          <p:nvPr/>
+        </p:nvSpPr>
+        <p:spPr>
+          <a:xfrm>
+            <a:off x="8073025" y="6416832"/>
+            <a:ext cx="4118975" cy="369332"/>
+          </a:xfrm>
+          <a:prstGeom prst="rect">
+            <a:avLst/>
+          </a:prstGeom>
+          <a:noFill/>
+        </p:spPr>
+        <p:txBody>
+          <a:bodyPr wrap="square">
+            <a:spAutoFit/>
+          </a:bodyPr>
+          <a:lstStyle/>
+          <a:p>
+            <a:pPr algn="ctr"/>
+            <a:r>
+              <a:rPr lang="en-US" dirty="0"/>
+              <a:t>UNIVERSITY OF HOUSTON DOWNTOWN</a:t>
+            </a:r>
+          </a:p>
+        </p:txBody>
+      </p:sp>
+      <p:sp>
+        <p:nvSpPr>
+          <p:cNvPr id="12" name="TextBox 11">
+            <a:extLst>
+              <a:ext uri="{FF2B5EF4-FFF2-40B4-BE49-F238E27FC236}">
+                <a16:creationId xmlns:a16="http://schemas.microsoft.com/office/drawing/2014/main" id="{73AFF964-F1A2-E0AB-70C8-E223FC237CC6}"/>
+              </a:ext>
+            </a:extLst>
+          </p:cNvPr>
+          <p:cNvSpPr txBox="1"/>
+          <p:nvPr/>
+        </p:nvSpPr>
+        <p:spPr>
+          <a:xfrm>
+            <a:off x="8295588" y="2884792"/>
+            <a:ext cx="3896412" cy="1938992"/>
+          </a:xfrm>
+          <a:prstGeom prst="rect">
+            <a:avLst/>
+          </a:prstGeom>
+          <a:noFill/>
+        </p:spPr>
+        <p:txBody>
+          <a:bodyPr wrap="square" rtlCol="0">
+            <a:spAutoFit/>
+          </a:bodyPr>
+          <a:lstStyle/>
+          <a:p>
+            <a:pPr marL="171450" indent="-171450">
+              <a:buFont typeface="Arial" panose="020B0604020202020204" pitchFamily="34" charset="0"/>
+              <a:buChar char="•"/>
+            </a:pPr>
+            <a:r>
+              <a:rPr lang="en-CA" sz="1200" b="0" i="0" dirty="0">
+                <a:solidFill>
+                  <a:srgbClr val="000000"/>
+                </a:solidFill>
+                <a:effectLst/>
+                <a:latin typeface="Menlo" panose="020B0609030804020204" pitchFamily="49" charset="0"/>
+              </a:rPr>
+              <a:t>Harvey Mudd College</a:t>
+            </a:r>
+          </a:p>
+          <a:p>
+            <a:pPr marL="171450" indent="-171450">
+              <a:buFont typeface="Arial" panose="020B0604020202020204" pitchFamily="34" charset="0"/>
+              <a:buChar char="•"/>
+            </a:pPr>
+            <a:r>
+              <a:rPr lang="en-CA" sz="1200" b="0" i="0" dirty="0">
+                <a:solidFill>
+                  <a:srgbClr val="000000"/>
+                </a:solidFill>
+                <a:effectLst/>
+                <a:latin typeface="Menlo" panose="020B0609030804020204" pitchFamily="49" charset="0"/>
+              </a:rPr>
+              <a:t>Santa Clara University</a:t>
+            </a:r>
+          </a:p>
+          <a:p>
+            <a:pPr marL="171450" indent="-171450">
+              <a:buFont typeface="Arial" panose="020B0604020202020204" pitchFamily="34" charset="0"/>
+              <a:buChar char="•"/>
+            </a:pPr>
+            <a:r>
+              <a:rPr lang="en-CA" sz="1200" b="0" i="0" dirty="0">
+                <a:solidFill>
+                  <a:srgbClr val="000000"/>
+                </a:solidFill>
+                <a:effectLst/>
+                <a:latin typeface="Menlo" panose="020B0609030804020204" pitchFamily="49" charset="0"/>
+              </a:rPr>
+              <a:t>Amherst College</a:t>
+            </a:r>
+          </a:p>
+          <a:p>
+            <a:pPr marL="171450" indent="-171450">
+              <a:buFont typeface="Arial" panose="020B0604020202020204" pitchFamily="34" charset="0"/>
+              <a:buChar char="•"/>
+            </a:pPr>
+            <a:r>
+              <a:rPr lang="en-CA" sz="1200" b="0" i="0" dirty="0">
+                <a:solidFill>
+                  <a:srgbClr val="000000"/>
+                </a:solidFill>
+                <a:effectLst/>
+                <a:latin typeface="Menlo" panose="020B0609030804020204" pitchFamily="49" charset="0"/>
+              </a:rPr>
+              <a:t>Harvard University</a:t>
+            </a:r>
+          </a:p>
+          <a:p>
+            <a:pPr marL="171450" indent="-171450">
+              <a:buFont typeface="Arial" panose="020B0604020202020204" pitchFamily="34" charset="0"/>
+              <a:buChar char="•"/>
+            </a:pPr>
+            <a:r>
+              <a:rPr lang="en-CA" sz="1200" b="0" i="0" dirty="0">
+                <a:solidFill>
+                  <a:srgbClr val="000000"/>
+                </a:solidFill>
+                <a:effectLst/>
+                <a:latin typeface="Menlo" panose="020B0609030804020204" pitchFamily="49" charset="0"/>
+              </a:rPr>
+              <a:t>Lindenwood College</a:t>
+            </a:r>
+          </a:p>
+          <a:p>
+            <a:pPr marL="171450" indent="-171450">
+              <a:buFont typeface="Arial" panose="020B0604020202020204" pitchFamily="34" charset="0"/>
+              <a:buChar char="•"/>
+            </a:pPr>
+            <a:r>
+              <a:rPr lang="en-CA" sz="1200" b="0" i="0" dirty="0">
+                <a:solidFill>
+                  <a:srgbClr val="000000"/>
+                </a:solidFill>
+                <a:effectLst/>
+                <a:latin typeface="Menlo" panose="020B0609030804020204" pitchFamily="49" charset="0"/>
+              </a:rPr>
+              <a:t>Missouri Southern State College</a:t>
+            </a:r>
+          </a:p>
+          <a:p>
+            <a:pPr marL="171450" indent="-171450">
+              <a:buFont typeface="Arial" panose="020B0604020202020204" pitchFamily="34" charset="0"/>
+              <a:buChar char="•"/>
+            </a:pPr>
+            <a:r>
+              <a:rPr lang="en-CA" sz="1200" b="0" i="0" dirty="0">
+                <a:solidFill>
+                  <a:srgbClr val="000000"/>
+                </a:solidFill>
+                <a:effectLst/>
+                <a:latin typeface="Menlo" panose="020B0609030804020204" pitchFamily="49" charset="0"/>
+              </a:rPr>
+              <a:t>Siena College College of Mount St. Joseph Grove City College </a:t>
+            </a:r>
+          </a:p>
+          <a:p>
+            <a:pPr marL="171450" indent="-171450">
+              <a:buFont typeface="Arial" panose="020B0604020202020204" pitchFamily="34" charset="0"/>
+              <a:buChar char="•"/>
+            </a:pPr>
+            <a:r>
+              <a:rPr lang="en-CA" sz="1200" b="0" i="0" dirty="0">
+                <a:solidFill>
+                  <a:srgbClr val="000000"/>
+                </a:solidFill>
+                <a:effectLst/>
+                <a:latin typeface="Menlo" panose="020B0609030804020204" pitchFamily="49" charset="0"/>
+              </a:rPr>
+              <a:t>University of Richmond Goddard College</a:t>
+            </a:r>
+          </a:p>
+          <a:p>
+            <a:pPr marL="171450" indent="-171450">
+              <a:buFont typeface="Arial" panose="020B0604020202020204" pitchFamily="34" charset="0"/>
+              <a:buChar char="•"/>
+            </a:pPr>
+            <a:r>
+              <a:rPr lang="en-CA" sz="1200" b="0" i="0" dirty="0">
+                <a:solidFill>
+                  <a:srgbClr val="000000"/>
+                </a:solidFill>
+                <a:effectLst/>
+                <a:latin typeface="Menlo" panose="020B0609030804020204" pitchFamily="49" charset="0"/>
+              </a:rPr>
+              <a:t>Heritage College</a:t>
+            </a:r>
+            <a:endParaRPr lang="en-US" sz="1200" dirty="0"/>
+          </a:p>
+        </p:txBody>
+      </p:sp>
+      <p:pic>
+        <p:nvPicPr>
+          <p:cNvPr id="16" name="Content Placeholder 15" descr="A graph of a graduation rate distribution&#10;&#10;Description automatically generated">
+            <a:extLst>
+              <a:ext uri="{FF2B5EF4-FFF2-40B4-BE49-F238E27FC236}">
+                <a16:creationId xmlns:a16="http://schemas.microsoft.com/office/drawing/2014/main" id="{8FC3FBA3-0DAE-0F01-237A-16AE7B0064A4}"/>
               </a:ext>
             </a:extLst>
           </p:cNvPr>
@@ -5629,33 +6028,6 @@
           </p:nvPr>
         </p:nvPicPr>
         <p:blipFill>
-          <a:blip r:embed="rId2"/>
-          <a:stretch>
-            <a:fillRect/>
-          </a:stretch>
-        </p:blipFill>
-        <p:spPr>
-          <a:xfrm>
-            <a:off x="6134155" y="1686887"/>
-            <a:ext cx="6057845" cy="4630024"/>
-          </a:xfrm>
-        </p:spPr>
-      </p:pic>
-      <p:pic>
-        <p:nvPicPr>
-          <p:cNvPr id="11" name="Picture 10" descr="A graph of average cost by region&#10;&#10;Description automatically generated">
-            <a:extLst>
-              <a:ext uri="{FF2B5EF4-FFF2-40B4-BE49-F238E27FC236}">
-                <a16:creationId xmlns:a16="http://schemas.microsoft.com/office/drawing/2014/main" id="{7B382D54-6636-C195-876A-5C22D07BAAEB}"/>
-              </a:ext>
-            </a:extLst>
-          </p:cNvPr>
-          <p:cNvPicPr>
-            <a:picLocks noChangeAspect="1"/>
-          </p:cNvPicPr>
-          <p:nvPr/>
-        </p:nvPicPr>
-        <p:blipFill>
           <a:blip r:embed="rId3"/>
           <a:stretch>
             <a:fillRect/>
@@ -5663,193 +6035,15 @@
         </p:blipFill>
         <p:spPr>
           <a:xfrm>
-            <a:off x="0" y="1686887"/>
-            <a:ext cx="6096000" cy="4630024"/>
-          </a:xfrm>
-          <a:prstGeom prst="rect">
-            <a:avLst/>
-          </a:prstGeom>
+            <a:off x="186965" y="135353"/>
+            <a:ext cx="7872392" cy="6444556"/>
+          </a:xfrm>
         </p:spPr>
       </p:pic>
-      <p:sp>
-        <p:nvSpPr>
-          <p:cNvPr id="14" name="TextBox 13">
-            <a:extLst>
-              <a:ext uri="{FF2B5EF4-FFF2-40B4-BE49-F238E27FC236}">
-                <a16:creationId xmlns:a16="http://schemas.microsoft.com/office/drawing/2014/main" id="{BB43246F-E693-F4A3-5D8F-04A3B0C23FF5}"/>
-              </a:ext>
-            </a:extLst>
-          </p:cNvPr>
-          <p:cNvSpPr txBox="1"/>
-          <p:nvPr/>
-        </p:nvSpPr>
-        <p:spPr>
-          <a:xfrm>
-            <a:off x="6096000" y="6316911"/>
-            <a:ext cx="6057845" cy="861774"/>
-          </a:xfrm>
-          <a:prstGeom prst="rect">
-            <a:avLst/>
-          </a:prstGeom>
-          <a:noFill/>
-        </p:spPr>
-        <p:txBody>
-          <a:bodyPr wrap="square" rtlCol="0">
-            <a:spAutoFit/>
-          </a:bodyPr>
-          <a:lstStyle/>
-          <a:p>
-            <a:r>
-              <a:rPr lang="en-US" sz="1600" dirty="0"/>
-              <a:t>Significant Differences Between the Average Cost  In State For Different Regions  </a:t>
-            </a:r>
-            <a:r>
-              <a:rPr lang="en-US" sz="1000" dirty="0"/>
-              <a:t>(</a:t>
-            </a:r>
-            <a:r>
-              <a:rPr lang="en-CA" sz="1000" b="0" i="0" dirty="0">
-                <a:solidFill>
-                  <a:srgbClr val="000000"/>
-                </a:solidFill>
-                <a:effectLst/>
-                <a:latin typeface="var(--notebook-cell-output-font-family)"/>
-              </a:rPr>
-              <a:t>AMOVA </a:t>
-            </a:r>
-            <a:r>
-              <a:rPr lang="en-CA" sz="1000" b="0" i="0" dirty="0" err="1">
-                <a:solidFill>
-                  <a:srgbClr val="000000"/>
-                </a:solidFill>
-                <a:effectLst/>
-                <a:latin typeface="var(--notebook-cell-output-font-family)"/>
-              </a:rPr>
-              <a:t>fvalue</a:t>
-            </a:r>
-            <a:r>
-              <a:rPr lang="en-CA" sz="1000" b="0" i="0" dirty="0">
-                <a:solidFill>
-                  <a:srgbClr val="000000"/>
-                </a:solidFill>
-                <a:effectLst/>
-                <a:latin typeface="var(--notebook-cell-output-font-family)"/>
-              </a:rPr>
-              <a:t>=18.14586886782207, </a:t>
-            </a:r>
-            <a:r>
-              <a:rPr lang="en-CA" sz="1000" b="0" i="0" dirty="0" err="1">
-                <a:solidFill>
-                  <a:srgbClr val="000000"/>
-                </a:solidFill>
-                <a:effectLst/>
-                <a:latin typeface="var(--notebook-cell-output-font-family)"/>
-              </a:rPr>
-              <a:t>pvalue</a:t>
-            </a:r>
-            <a:r>
-              <a:rPr lang="en-CA" sz="1000" b="0" i="0" dirty="0">
-                <a:solidFill>
-                  <a:srgbClr val="000000"/>
-                </a:solidFill>
-                <a:effectLst/>
-                <a:latin typeface="var(--notebook-cell-output-font-family)"/>
-              </a:rPr>
-              <a:t>=3.897390493224823e-11 )</a:t>
-            </a:r>
-          </a:p>
-          <a:p>
-            <a:endParaRPr lang="en-US" dirty="0"/>
-          </a:p>
-        </p:txBody>
-      </p:sp>
-      <p:sp>
-        <p:nvSpPr>
-          <p:cNvPr id="15" name="TextBox 14">
-            <a:extLst>
-              <a:ext uri="{FF2B5EF4-FFF2-40B4-BE49-F238E27FC236}">
-                <a16:creationId xmlns:a16="http://schemas.microsoft.com/office/drawing/2014/main" id="{19287114-0C66-9F38-DCB2-30622C6B422B}"/>
-              </a:ext>
-            </a:extLst>
-          </p:cNvPr>
-          <p:cNvSpPr txBox="1"/>
-          <p:nvPr/>
-        </p:nvSpPr>
-        <p:spPr>
-          <a:xfrm>
-            <a:off x="0" y="6316911"/>
-            <a:ext cx="6057845" cy="738664"/>
-          </a:xfrm>
-          <a:prstGeom prst="rect">
-            <a:avLst/>
-          </a:prstGeom>
-          <a:noFill/>
-        </p:spPr>
-        <p:txBody>
-          <a:bodyPr wrap="square" rtlCol="0">
-            <a:spAutoFit/>
-          </a:bodyPr>
-          <a:lstStyle/>
-          <a:p>
-            <a:r>
-              <a:rPr lang="en-US" sz="1600" dirty="0"/>
-              <a:t>Significant Differences Between the Average Cost  In State For Different Regions </a:t>
-            </a:r>
-            <a:r>
-              <a:rPr lang="en-US" sz="1000" dirty="0"/>
-              <a:t>( ANOVA </a:t>
-            </a:r>
-            <a:r>
-              <a:rPr lang="en-CA" sz="1000" b="0" i="0" dirty="0" err="1">
-                <a:solidFill>
-                  <a:srgbClr val="000000"/>
-                </a:solidFill>
-                <a:effectLst/>
-                <a:latin typeface="Menlo" panose="020B0609030804020204" pitchFamily="49" charset="0"/>
-              </a:rPr>
-              <a:t>fvalue</a:t>
-            </a:r>
-            <a:r>
-              <a:rPr lang="en-CA" sz="1000" b="0" i="0" dirty="0">
-                <a:solidFill>
-                  <a:srgbClr val="000000"/>
-                </a:solidFill>
-                <a:effectLst/>
-                <a:latin typeface="Menlo" panose="020B0609030804020204" pitchFamily="49" charset="0"/>
-              </a:rPr>
-              <a:t>=22.97054536966959, </a:t>
-            </a:r>
-            <a:r>
-              <a:rPr lang="en-CA" sz="1000" b="0" i="0" dirty="0" err="1">
-                <a:solidFill>
-                  <a:srgbClr val="000000"/>
-                </a:solidFill>
-                <a:effectLst/>
-                <a:latin typeface="Menlo" panose="020B0609030804020204" pitchFamily="49" charset="0"/>
-              </a:rPr>
-              <a:t>pvalue</a:t>
-            </a:r>
-            <a:r>
-              <a:rPr lang="en-CA" sz="1000" b="0" i="0" dirty="0">
-                <a:solidFill>
-                  <a:srgbClr val="000000"/>
-                </a:solidFill>
-                <a:effectLst/>
-                <a:latin typeface="Menlo" panose="020B0609030804020204" pitchFamily="49" charset="0"/>
-              </a:rPr>
-              <a:t>=7.732162944526283e-14)</a:t>
-            </a:r>
-            <a:br>
-              <a:rPr lang="en-CA" sz="1000" dirty="0"/>
-            </a:br>
-            <a:endParaRPr lang="en-US" sz="1000" dirty="0"/>
-          </a:p>
-        </p:txBody>
-      </p:sp>
     </p:spTree>
     <p:extLst>
       <p:ext uri="{BB962C8B-B14F-4D97-AF65-F5344CB8AC3E}">
-        <p14:creationId xmlns:p14="http://schemas.microsoft.com/office/powerpoint/2010/main" val="1700966129"/>
+        <p14:creationId xmlns:p14="http://schemas.microsoft.com/office/powerpoint/2010/main" val="3008327855"/>
       </p:ext>
     </p:extLst>
   </p:cSld>
@@ -5881,7 +6075,7 @@
           <p:cNvPr id="2" name="Title 1">
             <a:extLst>
               <a:ext uri="{FF2B5EF4-FFF2-40B4-BE49-F238E27FC236}">
-                <a16:creationId xmlns:a16="http://schemas.microsoft.com/office/drawing/2014/main" id="{F2E5C3AE-8204-1FB0-D002-BCC396DD46A4}"/>
+                <a16:creationId xmlns:a16="http://schemas.microsoft.com/office/drawing/2014/main" id="{632184AB-5586-D64E-377D-39B911A34381}"/>
               </a:ext>
             </a:extLst>
           </p:cNvPr>
@@ -5892,467 +6086,35 @@
             <p:ph type="title"/>
           </p:nvPr>
         </p:nvSpPr>
-        <p:spPr/>
-        <p:txBody>
-          <a:bodyPr/>
-          <a:lstStyle/>
-          <a:p>
-            <a:endParaRPr lang="en-US"/>
-          </a:p>
-        </p:txBody>
-      </p:sp>
-      <p:sp>
-        <p:nvSpPr>
-          <p:cNvPr id="3" name="TextBox 2">
-            <a:extLst>
-              <a:ext uri="{FF2B5EF4-FFF2-40B4-BE49-F238E27FC236}">
-                <a16:creationId xmlns:a16="http://schemas.microsoft.com/office/drawing/2014/main" id="{D481D90D-0225-7F4B-48DF-E5B2AFECDF05}"/>
-              </a:ext>
-            </a:extLst>
-          </p:cNvPr>
-          <p:cNvSpPr txBox="1"/>
-          <p:nvPr/>
-        </p:nvSpPr>
-        <p:spPr>
-          <a:xfrm>
-            <a:off x="8814657" y="135353"/>
-            <a:ext cx="2502608" cy="2308324"/>
-          </a:xfrm>
-          <a:prstGeom prst="rect">
-            <a:avLst/>
-          </a:prstGeom>
-          <a:noFill/>
-        </p:spPr>
-        <p:txBody>
-          <a:bodyPr wrap="none" rtlCol="0">
-            <a:spAutoFit/>
+        <p:spPr>
+          <a:xfrm>
+            <a:off x="0" y="0"/>
+            <a:ext cx="12192000" cy="631105"/>
+          </a:xfrm>
+        </p:spPr>
+        <p:txBody>
+          <a:bodyPr>
+            <a:normAutofit fontScale="90000"/>
           </a:bodyPr>
           <a:lstStyle/>
           <a:p>
             <a:r>
-              <a:rPr lang="en-CA" b="1" i="0" dirty="0">
-                <a:solidFill>
-                  <a:srgbClr val="000000"/>
-                </a:solidFill>
-                <a:effectLst/>
-                <a:latin typeface="Menlo" panose="020B0609030804020204" pitchFamily="49" charset="0"/>
+              <a:rPr lang="en-US" dirty="0">
+                <a:solidFill>
+                  <a:srgbClr val="701F57"/>
+                </a:solidFill>
               </a:rPr>
-              <a:t>mean 	60.343023</a:t>
-            </a:r>
-          </a:p>
-          <a:p>
-            <a:r>
-              <a:rPr lang="en-CA" b="1" i="0" dirty="0">
-                <a:solidFill>
-                  <a:srgbClr val="000000"/>
-                </a:solidFill>
-                <a:effectLst/>
-                <a:latin typeface="Menlo" panose="020B0609030804020204" pitchFamily="49" charset="0"/>
-              </a:rPr>
-              <a:t>std 	18.822515</a:t>
-            </a:r>
-          </a:p>
-          <a:p>
-            <a:r>
-              <a:rPr lang="en-CA" b="1" i="0" dirty="0">
-                <a:solidFill>
-                  <a:srgbClr val="000000"/>
-                </a:solidFill>
-                <a:effectLst/>
-                <a:latin typeface="Menlo" panose="020B0609030804020204" pitchFamily="49" charset="0"/>
-              </a:rPr>
-              <a:t>min 	8.000000</a:t>
-            </a:r>
-          </a:p>
-          <a:p>
-            <a:r>
-              <a:rPr lang="en-CA" b="1" i="0" dirty="0">
-                <a:solidFill>
-                  <a:srgbClr val="000000"/>
-                </a:solidFill>
-                <a:effectLst/>
-                <a:latin typeface="Menlo" panose="020B0609030804020204" pitchFamily="49" charset="0"/>
-              </a:rPr>
-              <a:t>Max	100 </a:t>
-            </a:r>
-          </a:p>
-          <a:p>
-            <a:r>
-              <a:rPr lang="en-CA" b="1" i="0" dirty="0">
-                <a:solidFill>
-                  <a:srgbClr val="000000"/>
-                </a:solidFill>
-                <a:effectLst/>
-                <a:latin typeface="Menlo" panose="020B0609030804020204" pitchFamily="49" charset="0"/>
-              </a:rPr>
-              <a:t>25% 	47.000000 </a:t>
-            </a:r>
-          </a:p>
-          <a:p>
-            <a:r>
-              <a:rPr lang="en-CA" b="1" i="0" dirty="0">
-                <a:solidFill>
-                  <a:srgbClr val="000000"/>
-                </a:solidFill>
-                <a:effectLst/>
-                <a:latin typeface="Menlo" panose="020B0609030804020204" pitchFamily="49" charset="0"/>
-              </a:rPr>
-              <a:t>50% 	60.000000 </a:t>
-            </a:r>
-          </a:p>
-          <a:p>
-            <a:r>
-              <a:rPr lang="en-CA" b="1" i="0" dirty="0">
-                <a:solidFill>
-                  <a:srgbClr val="000000"/>
-                </a:solidFill>
-                <a:effectLst/>
-                <a:latin typeface="Menlo" panose="020B0609030804020204" pitchFamily="49" charset="0"/>
-              </a:rPr>
-              <a:t>75% 	74.000000 </a:t>
-            </a:r>
-            <a:br>
-              <a:rPr lang="en-CA" b="1" dirty="0"/>
-            </a:br>
-            <a:endParaRPr lang="en-US" b="1" dirty="0"/>
+              <a:t>Graduation Rates:  Private Schools Do Better</a:t>
+            </a:r>
           </a:p>
         </p:txBody>
       </p:sp>
       <p:pic>
         <p:nvPicPr>
-          <p:cNvPr id="1026" name="Picture 2">
-            <a:extLst>
-              <a:ext uri="{FF2B5EF4-FFF2-40B4-BE49-F238E27FC236}">
-                <a16:creationId xmlns:a16="http://schemas.microsoft.com/office/drawing/2014/main" id="{50DD376F-0EDA-34D9-BD40-ADBF120B74B4}"/>
-              </a:ext>
-            </a:extLst>
-          </p:cNvPr>
-          <p:cNvPicPr>
-            <a:picLocks noChangeAspect="1" noChangeArrowheads="1"/>
-          </p:cNvPicPr>
-          <p:nvPr/>
-        </p:nvPicPr>
-        <p:blipFill>
-          <a:blip r:embed="rId2">
-            <a:extLst>
-              <a:ext uri="{28A0092B-C50C-407E-A947-70E740481C1C}">
-                <a14:useLocalDpi xmlns:a14="http://schemas.microsoft.com/office/drawing/2010/main" val="0"/>
-              </a:ext>
-            </a:extLst>
-          </a:blip>
-          <a:srcRect/>
-          <a:stretch>
-            <a:fillRect/>
-          </a:stretch>
-        </p:blipFill>
-        <p:spPr bwMode="auto">
-          <a:xfrm>
-            <a:off x="8946383" y="5745348"/>
-            <a:ext cx="1734815" cy="743492"/>
-          </a:xfrm>
-          <a:prstGeom prst="rect">
-            <a:avLst/>
-          </a:prstGeom>
-          <a:noFill/>
-          <a:extLst>
-            <a:ext uri="{909E8E84-426E-40DD-AFC4-6F175D3DCCD1}">
-              <a14:hiddenFill xmlns:a14="http://schemas.microsoft.com/office/drawing/2010/main">
-                <a:solidFill>
-                  <a:srgbClr val="FFFFFF"/>
-                </a:solidFill>
-              </a14:hiddenFill>
-            </a:ext>
-          </a:extLst>
-        </p:spPr>
-      </p:pic>
-      <p:sp>
-        <p:nvSpPr>
-          <p:cNvPr id="6" name="TextBox 5">
-            <a:extLst>
-              <a:ext uri="{FF2B5EF4-FFF2-40B4-BE49-F238E27FC236}">
-                <a16:creationId xmlns:a16="http://schemas.microsoft.com/office/drawing/2014/main" id="{FE6C817F-05CE-2991-E202-E174B9BB4AC5}"/>
-              </a:ext>
-            </a:extLst>
-          </p:cNvPr>
-          <p:cNvSpPr txBox="1"/>
-          <p:nvPr/>
-        </p:nvSpPr>
-        <p:spPr>
-          <a:xfrm>
-            <a:off x="7966552" y="2497093"/>
-            <a:ext cx="4225447" cy="369332"/>
-          </a:xfrm>
-          <a:prstGeom prst="rect">
-            <a:avLst/>
-          </a:prstGeom>
-          <a:noFill/>
-        </p:spPr>
-        <p:txBody>
-          <a:bodyPr wrap="square" rtlCol="0">
-            <a:spAutoFit/>
-          </a:bodyPr>
-          <a:lstStyle/>
-          <a:p>
-            <a:pPr algn="ctr"/>
-            <a:r>
-              <a:rPr lang="en-US" dirty="0"/>
-              <a:t>THE BEST AT 100% GRADUATION RATE</a:t>
-            </a:r>
-          </a:p>
-        </p:txBody>
-      </p:sp>
-      <p:sp>
-        <p:nvSpPr>
-          <p:cNvPr id="9" name="TextBox 8">
-            <a:extLst>
-              <a:ext uri="{FF2B5EF4-FFF2-40B4-BE49-F238E27FC236}">
-                <a16:creationId xmlns:a16="http://schemas.microsoft.com/office/drawing/2014/main" id="{454F0367-44F6-CAFB-D524-6ED250A2BE1C}"/>
-              </a:ext>
-            </a:extLst>
-          </p:cNvPr>
-          <p:cNvSpPr txBox="1"/>
-          <p:nvPr/>
-        </p:nvSpPr>
-        <p:spPr>
-          <a:xfrm>
-            <a:off x="7966553" y="5345286"/>
-            <a:ext cx="4225447" cy="369332"/>
-          </a:xfrm>
-          <a:prstGeom prst="rect">
-            <a:avLst/>
-          </a:prstGeom>
-          <a:noFill/>
-        </p:spPr>
-        <p:txBody>
-          <a:bodyPr wrap="square">
-            <a:spAutoFit/>
-          </a:bodyPr>
-          <a:lstStyle/>
-          <a:p>
-            <a:pPr algn="ctr"/>
-            <a:r>
-              <a:rPr lang="en-US" dirty="0"/>
-              <a:t>THE WORST AT 8% GRADUATION RATE</a:t>
-            </a:r>
-          </a:p>
-        </p:txBody>
-      </p:sp>
-      <p:sp>
-        <p:nvSpPr>
-          <p:cNvPr id="11" name="TextBox 10">
-            <a:extLst>
-              <a:ext uri="{FF2B5EF4-FFF2-40B4-BE49-F238E27FC236}">
-                <a16:creationId xmlns:a16="http://schemas.microsoft.com/office/drawing/2014/main" id="{B9201EA1-345A-04F8-BCAD-E430B5320476}"/>
-              </a:ext>
-            </a:extLst>
-          </p:cNvPr>
-          <p:cNvSpPr txBox="1"/>
-          <p:nvPr/>
-        </p:nvSpPr>
-        <p:spPr>
-          <a:xfrm>
-            <a:off x="8073025" y="6416832"/>
-            <a:ext cx="4118975" cy="369332"/>
-          </a:xfrm>
-          <a:prstGeom prst="rect">
-            <a:avLst/>
-          </a:prstGeom>
-          <a:noFill/>
-        </p:spPr>
-        <p:txBody>
-          <a:bodyPr wrap="square">
-            <a:spAutoFit/>
-          </a:bodyPr>
-          <a:lstStyle/>
-          <a:p>
-            <a:pPr algn="ctr"/>
-            <a:r>
-              <a:rPr lang="en-US" dirty="0"/>
-              <a:t>UNIVERSITY OF HOUSTON DOWNTOWN</a:t>
-            </a:r>
-          </a:p>
-        </p:txBody>
-      </p:sp>
-      <p:sp>
-        <p:nvSpPr>
-          <p:cNvPr id="12" name="TextBox 11">
-            <a:extLst>
-              <a:ext uri="{FF2B5EF4-FFF2-40B4-BE49-F238E27FC236}">
-                <a16:creationId xmlns:a16="http://schemas.microsoft.com/office/drawing/2014/main" id="{73AFF964-F1A2-E0AB-70C8-E223FC237CC6}"/>
-              </a:ext>
-            </a:extLst>
-          </p:cNvPr>
-          <p:cNvSpPr txBox="1"/>
-          <p:nvPr/>
-        </p:nvSpPr>
-        <p:spPr>
-          <a:xfrm>
-            <a:off x="8295588" y="2884792"/>
-            <a:ext cx="3896412" cy="1938992"/>
-          </a:xfrm>
-          <a:prstGeom prst="rect">
-            <a:avLst/>
-          </a:prstGeom>
-          <a:noFill/>
-        </p:spPr>
-        <p:txBody>
-          <a:bodyPr wrap="square" rtlCol="0">
-            <a:spAutoFit/>
-          </a:bodyPr>
-          <a:lstStyle/>
-          <a:p>
-            <a:pPr marL="171450" indent="-171450">
-              <a:buFont typeface="Arial" panose="020B0604020202020204" pitchFamily="34" charset="0"/>
-              <a:buChar char="•"/>
-            </a:pPr>
-            <a:r>
-              <a:rPr lang="en-CA" sz="1200" b="0" i="0" dirty="0">
-                <a:solidFill>
-                  <a:srgbClr val="000000"/>
-                </a:solidFill>
-                <a:effectLst/>
-                <a:latin typeface="Menlo" panose="020B0609030804020204" pitchFamily="49" charset="0"/>
-              </a:rPr>
-              <a:t>Harvey Mudd College</a:t>
-            </a:r>
-          </a:p>
-          <a:p>
-            <a:pPr marL="171450" indent="-171450">
-              <a:buFont typeface="Arial" panose="020B0604020202020204" pitchFamily="34" charset="0"/>
-              <a:buChar char="•"/>
-            </a:pPr>
-            <a:r>
-              <a:rPr lang="en-CA" sz="1200" b="0" i="0" dirty="0">
-                <a:solidFill>
-                  <a:srgbClr val="000000"/>
-                </a:solidFill>
-                <a:effectLst/>
-                <a:latin typeface="Menlo" panose="020B0609030804020204" pitchFamily="49" charset="0"/>
-              </a:rPr>
-              <a:t>Santa Clara University</a:t>
-            </a:r>
-          </a:p>
-          <a:p>
-            <a:pPr marL="171450" indent="-171450">
-              <a:buFont typeface="Arial" panose="020B0604020202020204" pitchFamily="34" charset="0"/>
-              <a:buChar char="•"/>
-            </a:pPr>
-            <a:r>
-              <a:rPr lang="en-CA" sz="1200" b="0" i="0" dirty="0">
-                <a:solidFill>
-                  <a:srgbClr val="000000"/>
-                </a:solidFill>
-                <a:effectLst/>
-                <a:latin typeface="Menlo" panose="020B0609030804020204" pitchFamily="49" charset="0"/>
-              </a:rPr>
-              <a:t>Amherst College</a:t>
-            </a:r>
-          </a:p>
-          <a:p>
-            <a:pPr marL="171450" indent="-171450">
-              <a:buFont typeface="Arial" panose="020B0604020202020204" pitchFamily="34" charset="0"/>
-              <a:buChar char="•"/>
-            </a:pPr>
-            <a:r>
-              <a:rPr lang="en-CA" sz="1200" b="0" i="0" dirty="0">
-                <a:solidFill>
-                  <a:srgbClr val="000000"/>
-                </a:solidFill>
-                <a:effectLst/>
-                <a:latin typeface="Menlo" panose="020B0609030804020204" pitchFamily="49" charset="0"/>
-              </a:rPr>
-              <a:t>Harvard University</a:t>
-            </a:r>
-          </a:p>
-          <a:p>
-            <a:pPr marL="171450" indent="-171450">
-              <a:buFont typeface="Arial" panose="020B0604020202020204" pitchFamily="34" charset="0"/>
-              <a:buChar char="•"/>
-            </a:pPr>
-            <a:r>
-              <a:rPr lang="en-CA" sz="1200" b="0" i="0" dirty="0">
-                <a:solidFill>
-                  <a:srgbClr val="000000"/>
-                </a:solidFill>
-                <a:effectLst/>
-                <a:latin typeface="Menlo" panose="020B0609030804020204" pitchFamily="49" charset="0"/>
-              </a:rPr>
-              <a:t>Lindenwood College</a:t>
-            </a:r>
-          </a:p>
-          <a:p>
-            <a:pPr marL="171450" indent="-171450">
-              <a:buFont typeface="Arial" panose="020B0604020202020204" pitchFamily="34" charset="0"/>
-              <a:buChar char="•"/>
-            </a:pPr>
-            <a:r>
-              <a:rPr lang="en-CA" sz="1200" b="0" i="0" dirty="0">
-                <a:solidFill>
-                  <a:srgbClr val="000000"/>
-                </a:solidFill>
-                <a:effectLst/>
-                <a:latin typeface="Menlo" panose="020B0609030804020204" pitchFamily="49" charset="0"/>
-              </a:rPr>
-              <a:t>Missouri Southern State College</a:t>
-            </a:r>
-          </a:p>
-          <a:p>
-            <a:pPr marL="171450" indent="-171450">
-              <a:buFont typeface="Arial" panose="020B0604020202020204" pitchFamily="34" charset="0"/>
-              <a:buChar char="•"/>
-            </a:pPr>
-            <a:r>
-              <a:rPr lang="en-CA" sz="1200" b="0" i="0" dirty="0">
-                <a:solidFill>
-                  <a:srgbClr val="000000"/>
-                </a:solidFill>
-                <a:effectLst/>
-                <a:latin typeface="Menlo" panose="020B0609030804020204" pitchFamily="49" charset="0"/>
-              </a:rPr>
-              <a:t>Siena College College of Mount St. Joseph Grove City College </a:t>
-            </a:r>
-          </a:p>
-          <a:p>
-            <a:pPr marL="171450" indent="-171450">
-              <a:buFont typeface="Arial" panose="020B0604020202020204" pitchFamily="34" charset="0"/>
-              <a:buChar char="•"/>
-            </a:pPr>
-            <a:r>
-              <a:rPr lang="en-CA" sz="1200" b="0" i="0" dirty="0">
-                <a:solidFill>
-                  <a:srgbClr val="000000"/>
-                </a:solidFill>
-                <a:effectLst/>
-                <a:latin typeface="Menlo" panose="020B0609030804020204" pitchFamily="49" charset="0"/>
-              </a:rPr>
-              <a:t>University of Richmond Goddard College</a:t>
-            </a:r>
-          </a:p>
-          <a:p>
-            <a:pPr marL="171450" indent="-171450">
-              <a:buFont typeface="Arial" panose="020B0604020202020204" pitchFamily="34" charset="0"/>
-              <a:buChar char="•"/>
-            </a:pPr>
-            <a:r>
-              <a:rPr lang="en-CA" sz="1200" b="0" i="0" dirty="0">
-                <a:solidFill>
-                  <a:srgbClr val="000000"/>
-                </a:solidFill>
-                <a:effectLst/>
-                <a:latin typeface="Menlo" panose="020B0609030804020204" pitchFamily="49" charset="0"/>
-              </a:rPr>
-              <a:t>Heritage College</a:t>
-            </a:r>
-            <a:endParaRPr lang="en-US" sz="1200" dirty="0"/>
-          </a:p>
-        </p:txBody>
-      </p:sp>
-      <p:pic>
-        <p:nvPicPr>
-          <p:cNvPr id="16" name="Content Placeholder 15" descr="A graph of a graduation rate distribution&#10;&#10;Description automatically generated">
-            <a:extLst>
-              <a:ext uri="{FF2B5EF4-FFF2-40B4-BE49-F238E27FC236}">
-                <a16:creationId xmlns:a16="http://schemas.microsoft.com/office/drawing/2014/main" id="{8FC3FBA3-0DAE-0F01-237A-16AE7B0064A4}"/>
+          <p:cNvPr id="5" name="Content Placeholder 4" descr="A graph of a graph of a number of people&#10;&#10;Description automatically generated with medium confidence">
+            <a:extLst>
+              <a:ext uri="{FF2B5EF4-FFF2-40B4-BE49-F238E27FC236}">
+                <a16:creationId xmlns:a16="http://schemas.microsoft.com/office/drawing/2014/main" id="{9A922F3B-591B-2E3D-9E0E-7578697F9384}"/>
               </a:ext>
             </a:extLst>
           </p:cNvPr>
@@ -6364,22 +6126,236 @@
           </p:nvPr>
         </p:nvPicPr>
         <p:blipFill>
-          <a:blip r:embed="rId3"/>
+          <a:blip r:embed="rId2"/>
           <a:stretch>
             <a:fillRect/>
           </a:stretch>
         </p:blipFill>
         <p:spPr>
           <a:xfrm>
-            <a:off x="186965" y="135353"/>
-            <a:ext cx="7872392" cy="6444556"/>
+            <a:off x="145788" y="900006"/>
+            <a:ext cx="7216546" cy="5836141"/>
           </a:xfrm>
         </p:spPr>
       </p:pic>
+      <p:sp>
+        <p:nvSpPr>
+          <p:cNvPr id="6" name="TextBox 5">
+            <a:extLst>
+              <a:ext uri="{FF2B5EF4-FFF2-40B4-BE49-F238E27FC236}">
+                <a16:creationId xmlns:a16="http://schemas.microsoft.com/office/drawing/2014/main" id="{CB6E8BD3-006D-84CD-B6E3-9D2E68F659E5}"/>
+              </a:ext>
+            </a:extLst>
+          </p:cNvPr>
+          <p:cNvSpPr txBox="1"/>
+          <p:nvPr/>
+        </p:nvSpPr>
+        <p:spPr>
+          <a:xfrm>
+            <a:off x="7508123" y="1061014"/>
+            <a:ext cx="4683878" cy="861774"/>
+          </a:xfrm>
+          <a:prstGeom prst="rect">
+            <a:avLst/>
+          </a:prstGeom>
+          <a:noFill/>
+        </p:spPr>
+        <p:txBody>
+          <a:bodyPr wrap="square" rtlCol="0">
+            <a:spAutoFit/>
+          </a:bodyPr>
+          <a:lstStyle/>
+          <a:p>
+            <a:pPr algn="ctr"/>
+            <a:r>
+              <a:rPr lang="en-US" dirty="0"/>
+              <a:t>Private Average Graduation Rate</a:t>
+            </a:r>
+          </a:p>
+          <a:p>
+            <a:pPr algn="ctr"/>
+            <a:r>
+              <a:rPr lang="en-CA" sz="3200" b="0" i="0" dirty="0">
+                <a:solidFill>
+                  <a:srgbClr val="000000"/>
+                </a:solidFill>
+                <a:effectLst/>
+                <a:latin typeface="Menlo" panose="020B0609030804020204" pitchFamily="49" charset="0"/>
+              </a:rPr>
+              <a:t>66.07</a:t>
+            </a:r>
+            <a:endParaRPr lang="en-US" sz="3200" dirty="0"/>
+          </a:p>
+        </p:txBody>
+      </p:sp>
+      <p:sp>
+        <p:nvSpPr>
+          <p:cNvPr id="7" name="TextBox 6">
+            <a:extLst>
+              <a:ext uri="{FF2B5EF4-FFF2-40B4-BE49-F238E27FC236}">
+                <a16:creationId xmlns:a16="http://schemas.microsoft.com/office/drawing/2014/main" id="{DC67AF4E-09B8-6D2A-C2F3-390EB471560B}"/>
+              </a:ext>
+            </a:extLst>
+          </p:cNvPr>
+          <p:cNvSpPr txBox="1"/>
+          <p:nvPr/>
+        </p:nvSpPr>
+        <p:spPr>
+          <a:xfrm>
+            <a:off x="7508123" y="2120006"/>
+            <a:ext cx="4683878" cy="861774"/>
+          </a:xfrm>
+          <a:prstGeom prst="rect">
+            <a:avLst/>
+          </a:prstGeom>
+          <a:noFill/>
+        </p:spPr>
+        <p:txBody>
+          <a:bodyPr wrap="square" rtlCol="0">
+            <a:spAutoFit/>
+          </a:bodyPr>
+          <a:lstStyle/>
+          <a:p>
+            <a:pPr algn="ctr"/>
+            <a:r>
+              <a:rPr lang="en-US" dirty="0"/>
+              <a:t>Public Average Graduation Rate</a:t>
+            </a:r>
+          </a:p>
+          <a:p>
+            <a:pPr algn="ctr"/>
+            <a:r>
+              <a:rPr lang="en-CA" sz="3200" b="0" i="0" dirty="0">
+                <a:solidFill>
+                  <a:srgbClr val="000000"/>
+                </a:solidFill>
+                <a:effectLst/>
+                <a:latin typeface="Menlo" panose="020B0609030804020204" pitchFamily="49" charset="0"/>
+              </a:rPr>
+              <a:t>50.18</a:t>
+            </a:r>
+            <a:endParaRPr lang="en-US" sz="3200" dirty="0"/>
+          </a:p>
+        </p:txBody>
+      </p:sp>
+      <p:sp>
+        <p:nvSpPr>
+          <p:cNvPr id="8" name="TextBox 7">
+            <a:extLst>
+              <a:ext uri="{FF2B5EF4-FFF2-40B4-BE49-F238E27FC236}">
+                <a16:creationId xmlns:a16="http://schemas.microsoft.com/office/drawing/2014/main" id="{D522BE9E-D028-AB15-0C02-311A43DF6340}"/>
+              </a:ext>
+            </a:extLst>
+          </p:cNvPr>
+          <p:cNvSpPr txBox="1"/>
+          <p:nvPr/>
+        </p:nvSpPr>
+        <p:spPr>
+          <a:xfrm>
+            <a:off x="7435228" y="5196821"/>
+            <a:ext cx="4683878" cy="923330"/>
+          </a:xfrm>
+          <a:prstGeom prst="rect">
+            <a:avLst/>
+          </a:prstGeom>
+          <a:noFill/>
+        </p:spPr>
+        <p:txBody>
+          <a:bodyPr wrap="square" rtlCol="0">
+            <a:spAutoFit/>
+          </a:bodyPr>
+          <a:lstStyle/>
+          <a:p>
+            <a:pPr algn="ctr"/>
+            <a:r>
+              <a:rPr lang="en-US" dirty="0"/>
+              <a:t>We must reject the null hypnosis that private and public school graduation rates are the same.</a:t>
+            </a:r>
+          </a:p>
+        </p:txBody>
+      </p:sp>
+      <p:sp>
+        <p:nvSpPr>
+          <p:cNvPr id="9" name="TextBox 8">
+            <a:extLst>
+              <a:ext uri="{FF2B5EF4-FFF2-40B4-BE49-F238E27FC236}">
+                <a16:creationId xmlns:a16="http://schemas.microsoft.com/office/drawing/2014/main" id="{FEC09AC8-79CA-B702-1A88-B6FE3E5170B6}"/>
+              </a:ext>
+            </a:extLst>
+          </p:cNvPr>
+          <p:cNvSpPr txBox="1"/>
+          <p:nvPr/>
+        </p:nvSpPr>
+        <p:spPr>
+          <a:xfrm>
+            <a:off x="7362334" y="3377201"/>
+            <a:ext cx="4683878" cy="1231106"/>
+          </a:xfrm>
+          <a:prstGeom prst="rect">
+            <a:avLst/>
+          </a:prstGeom>
+          <a:noFill/>
+        </p:spPr>
+        <p:txBody>
+          <a:bodyPr wrap="square" rtlCol="0">
+            <a:spAutoFit/>
+          </a:bodyPr>
+          <a:lstStyle/>
+          <a:p>
+            <a:pPr algn="ctr"/>
+            <a:r>
+              <a:rPr lang="en-US" sz="1000" dirty="0"/>
+              <a:t>2-tailed t-test ( p-value: 0.0, Statistic = 15.03*)</a:t>
+            </a:r>
+          </a:p>
+          <a:p>
+            <a:pPr algn="ctr"/>
+            <a:r>
+              <a:rPr lang="en-US" sz="3200" dirty="0"/>
+              <a:t>Statistically Significant Difference</a:t>
+            </a:r>
+          </a:p>
+        </p:txBody>
+      </p:sp>
+      <p:sp>
+        <p:nvSpPr>
+          <p:cNvPr id="10" name="TextBox 9">
+            <a:extLst>
+              <a:ext uri="{FF2B5EF4-FFF2-40B4-BE49-F238E27FC236}">
+                <a16:creationId xmlns:a16="http://schemas.microsoft.com/office/drawing/2014/main" id="{E5E0D9CC-F567-E096-671D-D134FE36EC75}"/>
+              </a:ext>
+            </a:extLst>
+          </p:cNvPr>
+          <p:cNvSpPr txBox="1"/>
+          <p:nvPr/>
+        </p:nvSpPr>
+        <p:spPr>
+          <a:xfrm>
+            <a:off x="9777167" y="6624138"/>
+            <a:ext cx="3455250" cy="276999"/>
+          </a:xfrm>
+          <a:prstGeom prst="rect">
+            <a:avLst/>
+          </a:prstGeom>
+          <a:noFill/>
+        </p:spPr>
+        <p:txBody>
+          <a:bodyPr wrap="square" rtlCol="0">
+            <a:spAutoFit/>
+          </a:bodyPr>
+          <a:lstStyle/>
+          <a:p>
+            <a:r>
+              <a:rPr lang="en-US" sz="1200" dirty="0"/>
+              <a:t>* p-values are exceedingly small</a:t>
+            </a:r>
+          </a:p>
+        </p:txBody>
+      </p:sp>
     </p:spTree>
     <p:extLst>
       <p:ext uri="{BB962C8B-B14F-4D97-AF65-F5344CB8AC3E}">
-        <p14:creationId xmlns:p14="http://schemas.microsoft.com/office/powerpoint/2010/main" val="3008327855"/>
+        <p14:creationId xmlns:p14="http://schemas.microsoft.com/office/powerpoint/2010/main" val="1938083546"/>
       </p:ext>
     </p:extLst>
   </p:cSld>
@@ -6822,31 +6798,50 @@
       </p:grpSpPr>
       <p:sp>
         <p:nvSpPr>
-          <p:cNvPr id="2" name="Title 1">
-            <a:extLst>
-              <a:ext uri="{FF2B5EF4-FFF2-40B4-BE49-F238E27FC236}">
-                <a16:creationId xmlns:a16="http://schemas.microsoft.com/office/drawing/2014/main" id="{632184AB-5586-D64E-377D-39B911A34381}"/>
-              </a:ext>
-            </a:extLst>
-          </p:cNvPr>
-          <p:cNvSpPr>
-            <a:spLocks noGrp="1"/>
+          <p:cNvPr id="4" name="Title 1">
+            <a:extLst>
+              <a:ext uri="{FF2B5EF4-FFF2-40B4-BE49-F238E27FC236}">
+                <a16:creationId xmlns:a16="http://schemas.microsoft.com/office/drawing/2014/main" id="{A9801A69-C999-865C-734A-B3C16C77B238}"/>
+              </a:ext>
+            </a:extLst>
+          </p:cNvPr>
+          <p:cNvSpPr txBox="1">
+            <a:spLocks/>
           </p:cNvSpPr>
-          <p:nvPr>
-            <p:ph type="title"/>
-          </p:nvPr>
+          <p:nvPr/>
         </p:nvSpPr>
         <p:spPr>
           <a:xfrm>
             <a:off x="0" y="0"/>
-            <a:ext cx="12192000" cy="631105"/>
-          </a:xfrm>
-        </p:spPr>
-        <p:txBody>
-          <a:bodyPr>
-            <a:normAutofit fontScale="90000"/>
+            <a:ext cx="12192000" cy="724405"/>
+          </a:xfrm>
+          <a:prstGeom prst="rect">
+            <a:avLst/>
+          </a:prstGeom>
+        </p:spPr>
+        <p:txBody>
+          <a:bodyPr vert="horz" lIns="91440" tIns="45720" rIns="91440" bIns="45720" rtlCol="0" anchor="ctr">
+            <a:normAutofit/>
           </a:bodyPr>
-          <a:lstStyle/>
+          <a:lstStyle>
+            <a:lvl1pPr algn="l" defTabSz="914400" rtl="0" eaLnBrk="1" latinLnBrk="0" hangingPunct="1">
+              <a:lnSpc>
+                <a:spcPct val="90000"/>
+              </a:lnSpc>
+              <a:spcBef>
+                <a:spcPct val="0"/>
+              </a:spcBef>
+              <a:buNone/>
+              <a:defRPr sz="4400" kern="1200">
+                <a:solidFill>
+                  <a:schemeClr val="tx1"/>
+                </a:solidFill>
+                <a:latin typeface="+mj-lt"/>
+                <a:ea typeface="+mj-ea"/>
+                <a:cs typeface="+mj-cs"/>
+              </a:defRPr>
+            </a:lvl1pPr>
+          </a:lstStyle>
           <a:p>
             <a:r>
               <a:rPr lang="en-US" dirty="0">
@@ -6854,17 +6849,17 @@
                   <a:srgbClr val="701F57"/>
                 </a:solidFill>
               </a:rPr>
-              <a:t>Graduation Rates:  Private Schools Do Better</a:t>
+              <a:t>Graduation Rates:  Regional Differences Exist</a:t>
             </a:r>
           </a:p>
         </p:txBody>
       </p:sp>
       <p:pic>
         <p:nvPicPr>
-          <p:cNvPr id="5" name="Content Placeholder 4" descr="A graph of a graph of a number of people&#10;&#10;Description automatically generated with medium confidence">
-            <a:extLst>
-              <a:ext uri="{FF2B5EF4-FFF2-40B4-BE49-F238E27FC236}">
-                <a16:creationId xmlns:a16="http://schemas.microsoft.com/office/drawing/2014/main" id="{9A922F3B-591B-2E3D-9E0E-7578697F9384}"/>
+          <p:cNvPr id="14" name="Content Placeholder 13" descr="A graph of different colored bars&#10;&#10;Description automatically generated">
+            <a:extLst>
+              <a:ext uri="{FF2B5EF4-FFF2-40B4-BE49-F238E27FC236}">
+                <a16:creationId xmlns:a16="http://schemas.microsoft.com/office/drawing/2014/main" id="{4DC075B7-DA70-7C74-A6D0-C4911BD4AC55}"/>
               </a:ext>
             </a:extLst>
           </p:cNvPr>
@@ -6883,17 +6878,17 @@
         </p:blipFill>
         <p:spPr>
           <a:xfrm>
-            <a:off x="145788" y="900006"/>
-            <a:ext cx="7216546" cy="5836141"/>
+            <a:off x="234098" y="900006"/>
+            <a:ext cx="7007417" cy="5736464"/>
           </a:xfrm>
         </p:spPr>
       </p:pic>
       <p:sp>
         <p:nvSpPr>
-          <p:cNvPr id="6" name="TextBox 5">
-            <a:extLst>
-              <a:ext uri="{FF2B5EF4-FFF2-40B4-BE49-F238E27FC236}">
-                <a16:creationId xmlns:a16="http://schemas.microsoft.com/office/drawing/2014/main" id="{CB6E8BD3-006D-84CD-B6E3-9D2E68F659E5}"/>
+          <p:cNvPr id="15" name="TextBox 14">
+            <a:extLst>
+              <a:ext uri="{FF2B5EF4-FFF2-40B4-BE49-F238E27FC236}">
+                <a16:creationId xmlns:a16="http://schemas.microsoft.com/office/drawing/2014/main" id="{E90F21D2-A7C9-10C9-CFF5-67F28E2BF800}"/>
               </a:ext>
             </a:extLst>
           </p:cNvPr>
@@ -6902,8 +6897,8 @@
         </p:nvSpPr>
         <p:spPr>
           <a:xfrm>
-            <a:off x="7508123" y="1061014"/>
-            <a:ext cx="4683878" cy="861774"/>
+            <a:off x="7546235" y="847165"/>
+            <a:ext cx="4341044" cy="1200329"/>
           </a:xfrm>
           <a:prstGeom prst="rect">
             <a:avLst/>
@@ -6916,34 +6911,33 @@
           </a:bodyPr>
           <a:lstStyle/>
           <a:p>
-            <a:pPr algn="ctr"/>
-            <a:r>
-              <a:rPr lang="en-US" dirty="0"/>
-              <a:t>Private Average Graduation Rate</a:t>
-            </a:r>
-          </a:p>
-          <a:p>
-            <a:pPr algn="ctr"/>
-            <a:r>
-              <a:rPr lang="en-CA" sz="3200" b="0" i="0" dirty="0">
-                <a:solidFill>
-                  <a:srgbClr val="000000"/>
-                </a:solidFill>
-                <a:effectLst/>
-                <a:latin typeface="Menlo" panose="020B0609030804020204" pitchFamily="49" charset="0"/>
-              </a:rPr>
-              <a:t>66.07</a:t>
-            </a:r>
-            <a:endParaRPr lang="en-US" sz="3200" dirty="0"/>
-          </a:p>
-        </p:txBody>
-      </p:sp>
-      <p:sp>
-        <p:nvSpPr>
-          <p:cNvPr id="7" name="TextBox 6">
-            <a:extLst>
-              <a:ext uri="{FF2B5EF4-FFF2-40B4-BE49-F238E27FC236}">
-                <a16:creationId xmlns:a16="http://schemas.microsoft.com/office/drawing/2014/main" id="{DC67AF4E-09B8-6D2A-C2F3-390EB471560B}"/>
+            <a:r>
+              <a:rPr lang="en-US" sz="2000" dirty="0"/>
+              <a:t>Different US News and World Report Best College Regions 2016 have different graduation rates  </a:t>
+            </a:r>
+          </a:p>
+          <a:p>
+            <a:r>
+              <a:rPr lang="en-US" sz="1000" dirty="0"/>
+              <a:t>( ANOVA  p-value= 0.0, </a:t>
+            </a:r>
+            <a:r>
+              <a:rPr lang="en-US" sz="1000" dirty="0" err="1"/>
+              <a:t>fvalue</a:t>
+            </a:r>
+            <a:r>
+              <a:rPr lang="en-US" sz="1000" dirty="0"/>
+              <a:t>=47.13* ) </a:t>
+            </a:r>
+          </a:p>
+        </p:txBody>
+      </p:sp>
+      <p:sp>
+        <p:nvSpPr>
+          <p:cNvPr id="16" name="TextBox 15">
+            <a:extLst>
+              <a:ext uri="{FF2B5EF4-FFF2-40B4-BE49-F238E27FC236}">
+                <a16:creationId xmlns:a16="http://schemas.microsoft.com/office/drawing/2014/main" id="{B0A3509E-C7E1-D204-0521-08EF6D15925B}"/>
               </a:ext>
             </a:extLst>
           </p:cNvPr>
@@ -6952,8 +6946,8 @@
         </p:nvSpPr>
         <p:spPr>
           <a:xfrm>
-            <a:off x="7508123" y="2120006"/>
-            <a:ext cx="4683878" cy="861774"/>
+            <a:off x="7546235" y="2068630"/>
+            <a:ext cx="4341044" cy="830997"/>
           </a:xfrm>
           <a:prstGeom prst="rect">
             <a:avLst/>
@@ -6966,34 +6960,25 @@
           </a:bodyPr>
           <a:lstStyle/>
           <a:p>
-            <a:pPr algn="ctr"/>
             <a:r>
               <a:rPr lang="en-US" dirty="0"/>
-              <a:t>Public Average Graduation Rate</a:t>
-            </a:r>
-          </a:p>
-          <a:p>
-            <a:pPr algn="ctr"/>
-            <a:r>
-              <a:rPr lang="en-CA" sz="3200" b="0" i="0" dirty="0">
-                <a:solidFill>
-                  <a:srgbClr val="000000"/>
-                </a:solidFill>
-                <a:effectLst/>
-                <a:latin typeface="Menlo" panose="020B0609030804020204" pitchFamily="49" charset="0"/>
-              </a:rPr>
-              <a:t>50.18</a:t>
-            </a:r>
-            <a:endParaRPr lang="en-US" sz="3200" dirty="0"/>
-          </a:p>
-        </p:txBody>
-      </p:sp>
-      <p:sp>
-        <p:nvSpPr>
-          <p:cNvPr id="8" name="TextBox 7">
-            <a:extLst>
-              <a:ext uri="{FF2B5EF4-FFF2-40B4-BE49-F238E27FC236}">
-                <a16:creationId xmlns:a16="http://schemas.microsoft.com/office/drawing/2014/main" id="{D522BE9E-D028-AB15-0C02-311A43DF6340}"/>
+              <a:t>The North Region does significantly better then even the next highest Midwest Region </a:t>
+            </a:r>
+          </a:p>
+          <a:p>
+            <a:r>
+              <a:rPr lang="en-US" sz="1000" dirty="0"/>
+              <a:t>( t-test p-value=0.0, statistic=5.8 *) </a:t>
+            </a:r>
+          </a:p>
+        </p:txBody>
+      </p:sp>
+      <p:sp>
+        <p:nvSpPr>
+          <p:cNvPr id="17" name="TextBox 16">
+            <a:extLst>
+              <a:ext uri="{FF2B5EF4-FFF2-40B4-BE49-F238E27FC236}">
+                <a16:creationId xmlns:a16="http://schemas.microsoft.com/office/drawing/2014/main" id="{86F68670-AA1C-18AA-9EB2-3BDAB6DFF876}"/>
               </a:ext>
             </a:extLst>
           </p:cNvPr>
@@ -7002,8 +6987,8 @@
         </p:nvSpPr>
         <p:spPr>
           <a:xfrm>
-            <a:off x="7435228" y="5196821"/>
-            <a:ext cx="4683878" cy="923330"/>
+            <a:off x="7546235" y="3976144"/>
+            <a:ext cx="4341044" cy="830997"/>
           </a:xfrm>
           <a:prstGeom prst="rect">
             <a:avLst/>
@@ -7016,20 +7001,25 @@
           </a:bodyPr>
           <a:lstStyle/>
           <a:p>
-            <a:pPr algn="ctr"/>
             <a:r>
               <a:rPr lang="en-US" dirty="0"/>
-              <a:t>We must reject the null hypnosis that private and public school graduation rates are the same.</a:t>
-            </a:r>
-          </a:p>
-        </p:txBody>
-      </p:sp>
-      <p:sp>
-        <p:nvSpPr>
-          <p:cNvPr id="9" name="TextBox 8">
-            <a:extLst>
-              <a:ext uri="{FF2B5EF4-FFF2-40B4-BE49-F238E27FC236}">
-                <a16:creationId xmlns:a16="http://schemas.microsoft.com/office/drawing/2014/main" id="{FEC09AC8-79CA-B702-1A88-B6FE3E5170B6}"/>
+              <a:t>The Midwest does better than the West and South</a:t>
+            </a:r>
+          </a:p>
+          <a:p>
+            <a:r>
+              <a:rPr lang="en-US" sz="1000" dirty="0"/>
+              <a:t>( t-test p-value=0.002, statistic=3.02 *) </a:t>
+            </a:r>
+          </a:p>
+        </p:txBody>
+      </p:sp>
+      <p:sp>
+        <p:nvSpPr>
+          <p:cNvPr id="18" name="TextBox 17">
+            <a:extLst>
+              <a:ext uri="{FF2B5EF4-FFF2-40B4-BE49-F238E27FC236}">
+                <a16:creationId xmlns:a16="http://schemas.microsoft.com/office/drawing/2014/main" id="{5B2E507B-417F-74FF-5EB3-1BAA72E46EDE}"/>
               </a:ext>
             </a:extLst>
           </p:cNvPr>
@@ -7038,8 +7028,8 @@
         </p:nvSpPr>
         <p:spPr>
           <a:xfrm>
-            <a:off x="7362334" y="3377201"/>
-            <a:ext cx="4683878" cy="1231106"/>
+            <a:off x="9777167" y="6624138"/>
+            <a:ext cx="3455250" cy="276999"/>
           </a:xfrm>
           <a:prstGeom prst="rect">
             <a:avLst/>
@@ -7052,27 +7042,19 @@
           </a:bodyPr>
           <a:lstStyle/>
           <a:p>
-            <a:pPr algn="ctr"/>
-            <a:r>
-              <a:rPr lang="en-US" sz="1000" dirty="0"/>
-              <a:t>2-tailed t-test ( p-value: 0.0, Statistic = 15.03*)</a:t>
-            </a:r>
-          </a:p>
-          <a:p>
-            <a:pPr algn="ctr"/>
-            <a:r>
-              <a:rPr lang="en-US" sz="3200" dirty="0"/>
-              <a:t>Statistically Significant Difference</a:t>
-            </a:r>
-          </a:p>
-        </p:txBody>
-      </p:sp>
-      <p:sp>
-        <p:nvSpPr>
-          <p:cNvPr id="10" name="TextBox 9">
-            <a:extLst>
-              <a:ext uri="{FF2B5EF4-FFF2-40B4-BE49-F238E27FC236}">
-                <a16:creationId xmlns:a16="http://schemas.microsoft.com/office/drawing/2014/main" id="{E5E0D9CC-F567-E096-671D-D134FE36EC75}"/>
+            <a:r>
+              <a:rPr lang="en-US" sz="1200" dirty="0"/>
+              <a:t>* p-values are exceedingly small</a:t>
+            </a:r>
+          </a:p>
+        </p:txBody>
+      </p:sp>
+      <p:sp>
+        <p:nvSpPr>
+          <p:cNvPr id="20" name="TextBox 19">
+            <a:extLst>
+              <a:ext uri="{FF2B5EF4-FFF2-40B4-BE49-F238E27FC236}">
+                <a16:creationId xmlns:a16="http://schemas.microsoft.com/office/drawing/2014/main" id="{FD9F5FB0-67BE-3F2B-7B6B-2CA24E92E315}"/>
               </a:ext>
             </a:extLst>
           </p:cNvPr>
@@ -7081,8 +7063,8 @@
         </p:nvSpPr>
         <p:spPr>
           <a:xfrm>
-            <a:off x="9777167" y="6624138"/>
-            <a:ext cx="3455250" cy="276999"/>
+            <a:off x="7565756" y="3022387"/>
+            <a:ext cx="4422822" cy="830997"/>
           </a:xfrm>
           <a:prstGeom prst="rect">
             <a:avLst/>
@@ -7096,8 +7078,54 @@
           <a:lstStyle/>
           <a:p>
             <a:r>
-              <a:rPr lang="en-US" sz="1200" dirty="0"/>
-              <a:t>* p-values are exceedingly small</a:t>
+              <a:rPr lang="en-US" dirty="0"/>
+              <a:t>The West and South Region are not significantly better than each other</a:t>
+            </a:r>
+          </a:p>
+          <a:p>
+            <a:r>
+              <a:rPr lang="en-US" sz="1000" dirty="0"/>
+              <a:t>( t-test p-value=0.29, statistic=1.05 *) </a:t>
+            </a:r>
+          </a:p>
+        </p:txBody>
+      </p:sp>
+      <p:sp>
+        <p:nvSpPr>
+          <p:cNvPr id="21" name="TextBox 20">
+            <a:extLst>
+              <a:ext uri="{FF2B5EF4-FFF2-40B4-BE49-F238E27FC236}">
+                <a16:creationId xmlns:a16="http://schemas.microsoft.com/office/drawing/2014/main" id="{32F58916-7D38-07FD-436A-ABF2F7E9A3A3}"/>
+              </a:ext>
+            </a:extLst>
+          </p:cNvPr>
+          <p:cNvSpPr txBox="1"/>
+          <p:nvPr/>
+        </p:nvSpPr>
+        <p:spPr>
+          <a:xfrm>
+            <a:off x="7475613" y="5087506"/>
+            <a:ext cx="4341044" cy="954107"/>
+          </a:xfrm>
+          <a:prstGeom prst="rect">
+            <a:avLst/>
+          </a:prstGeom>
+          <a:noFill/>
+        </p:spPr>
+        <p:txBody>
+          <a:bodyPr wrap="square" rtlCol="0">
+            <a:spAutoFit/>
+          </a:bodyPr>
+          <a:lstStyle/>
+          <a:p>
+            <a:pPr algn="ctr"/>
+            <a:r>
+              <a:rPr lang="en-US" sz="2800" dirty="0">
+                <a:solidFill>
+                  <a:srgbClr val="35193E"/>
+                </a:solidFill>
+              </a:rPr>
+              <a:t>If you must graduate, attend North Region schools.</a:t>
             </a:r>
           </a:p>
         </p:txBody>
@@ -7105,7 +7133,7 @@
     </p:spTree>
     <p:extLst>
       <p:ext uri="{BB962C8B-B14F-4D97-AF65-F5344CB8AC3E}">
-        <p14:creationId xmlns:p14="http://schemas.microsoft.com/office/powerpoint/2010/main" val="1938083546"/>
+        <p14:creationId xmlns:p14="http://schemas.microsoft.com/office/powerpoint/2010/main" val="1096760155"/>
       </p:ext>
     </p:extLst>
   </p:cSld>
@@ -7134,50 +7162,29 @@
       </p:grpSpPr>
       <p:sp>
         <p:nvSpPr>
-          <p:cNvPr id="4" name="Title 1">
-            <a:extLst>
-              <a:ext uri="{FF2B5EF4-FFF2-40B4-BE49-F238E27FC236}">
-                <a16:creationId xmlns:a16="http://schemas.microsoft.com/office/drawing/2014/main" id="{A9801A69-C999-865C-734A-B3C16C77B238}"/>
-              </a:ext>
-            </a:extLst>
-          </p:cNvPr>
-          <p:cNvSpPr txBox="1">
-            <a:spLocks/>
+          <p:cNvPr id="2" name="Title 1">
+            <a:extLst>
+              <a:ext uri="{FF2B5EF4-FFF2-40B4-BE49-F238E27FC236}">
+                <a16:creationId xmlns:a16="http://schemas.microsoft.com/office/drawing/2014/main" id="{94866483-6B02-5DAF-0C50-C4BED80A07BE}"/>
+              </a:ext>
+            </a:extLst>
+          </p:cNvPr>
+          <p:cNvSpPr>
+            <a:spLocks noGrp="1"/>
           </p:cNvSpPr>
-          <p:nvPr/>
-        </p:nvSpPr>
-        <p:spPr>
-          <a:xfrm>
-            <a:off x="0" y="0"/>
-            <a:ext cx="12192000" cy="724405"/>
-          </a:xfrm>
-          <a:prstGeom prst="rect">
-            <a:avLst/>
-          </a:prstGeom>
-        </p:spPr>
-        <p:txBody>
-          <a:bodyPr vert="horz" lIns="91440" tIns="45720" rIns="91440" bIns="45720" rtlCol="0" anchor="ctr">
-            <a:normAutofit/>
-          </a:bodyPr>
-          <a:lstStyle>
-            <a:lvl1pPr algn="l" defTabSz="914400" rtl="0" eaLnBrk="1" latinLnBrk="0" hangingPunct="1">
-              <a:lnSpc>
-                <a:spcPct val="90000"/>
-              </a:lnSpc>
-              <a:spcBef>
-                <a:spcPct val="0"/>
-              </a:spcBef>
-              <a:buNone/>
-              <a:defRPr sz="4400" kern="1200">
-                <a:solidFill>
-                  <a:schemeClr val="tx1"/>
-                </a:solidFill>
-                <a:latin typeface="+mj-lt"/>
-                <a:ea typeface="+mj-ea"/>
-                <a:cs typeface="+mj-cs"/>
-              </a:defRPr>
-            </a:lvl1pPr>
-          </a:lstStyle>
+          <p:nvPr>
+            <p:ph type="title"/>
+          </p:nvPr>
+        </p:nvSpPr>
+        <p:spPr>
+          <a:xfrm>
+            <a:off x="358220" y="1"/>
+            <a:ext cx="11833780" cy="1003954"/>
+          </a:xfrm>
+        </p:spPr>
+        <p:txBody>
+          <a:bodyPr/>
+          <a:lstStyle/>
           <a:p>
             <a:r>
               <a:rPr lang="en-US" dirty="0">
@@ -7185,17 +7192,17 @@
                   <a:srgbClr val="701F57"/>
                 </a:solidFill>
               </a:rPr>
-              <a:t>Graduation Rates:  Regional Differences Exist</a:t>
+              <a:t>Graduation Rates: Tuition Up, Graduation Rate Up</a:t>
             </a:r>
           </a:p>
         </p:txBody>
       </p:sp>
       <p:pic>
         <p:nvPicPr>
-          <p:cNvPr id="14" name="Content Placeholder 13" descr="A graph of different colored bars&#10;&#10;Description automatically generated">
-            <a:extLst>
-              <a:ext uri="{FF2B5EF4-FFF2-40B4-BE49-F238E27FC236}">
-                <a16:creationId xmlns:a16="http://schemas.microsoft.com/office/drawing/2014/main" id="{4DC075B7-DA70-7C74-A6D0-C4911BD4AC55}"/>
+          <p:cNvPr id="5" name="Content Placeholder 4" descr="A graph of a graduation rate&#10;&#10;Description automatically generated">
+            <a:extLst>
+              <a:ext uri="{FF2B5EF4-FFF2-40B4-BE49-F238E27FC236}">
+                <a16:creationId xmlns:a16="http://schemas.microsoft.com/office/drawing/2014/main" id="{6194AAF0-4DC9-B6D9-DB20-8B109B0C1707}"/>
               </a:ext>
             </a:extLst>
           </p:cNvPr>
@@ -7214,17 +7221,47 @@
         </p:blipFill>
         <p:spPr>
           <a:xfrm>
-            <a:off x="234098" y="900006"/>
-            <a:ext cx="7007417" cy="5736464"/>
+            <a:off x="109326" y="1163498"/>
+            <a:ext cx="6041337" cy="4531003"/>
           </a:xfrm>
         </p:spPr>
       </p:pic>
-      <p:sp>
-        <p:nvSpPr>
-          <p:cNvPr id="15" name="TextBox 14">
-            <a:extLst>
-              <a:ext uri="{FF2B5EF4-FFF2-40B4-BE49-F238E27FC236}">
-                <a16:creationId xmlns:a16="http://schemas.microsoft.com/office/drawing/2014/main" id="{E90F21D2-A7C9-10C9-CFF5-67F28E2BF800}"/>
+      <p:pic>
+        <p:nvPicPr>
+          <p:cNvPr id="9" name="Picture 8" descr="A graph of a graduation rate&#10;&#10;Description automatically generated">
+            <a:extLst>
+              <a:ext uri="{FF2B5EF4-FFF2-40B4-BE49-F238E27FC236}">
+                <a16:creationId xmlns:a16="http://schemas.microsoft.com/office/drawing/2014/main" id="{3164DDFE-5165-7557-4E91-EF7158921E4B}"/>
+              </a:ext>
+            </a:extLst>
+          </p:cNvPr>
+          <p:cNvPicPr>
+            <a:picLocks noChangeAspect="1"/>
+          </p:cNvPicPr>
+          <p:nvPr/>
+        </p:nvPicPr>
+        <p:blipFill>
+          <a:blip r:embed="rId3"/>
+          <a:stretch>
+            <a:fillRect/>
+          </a:stretch>
+        </p:blipFill>
+        <p:spPr>
+          <a:xfrm>
+            <a:off x="6150663" y="1163498"/>
+            <a:ext cx="6041337" cy="4531003"/>
+          </a:xfrm>
+          <a:prstGeom prst="rect">
+            <a:avLst/>
+          </a:prstGeom>
+        </p:spPr>
+      </p:pic>
+      <p:sp>
+        <p:nvSpPr>
+          <p:cNvPr id="10" name="TextBox 9">
+            <a:extLst>
+              <a:ext uri="{FF2B5EF4-FFF2-40B4-BE49-F238E27FC236}">
+                <a16:creationId xmlns:a16="http://schemas.microsoft.com/office/drawing/2014/main" id="{1BC07490-E4DC-47B5-A06C-4BB206139128}"/>
               </a:ext>
             </a:extLst>
           </p:cNvPr>
@@ -7233,8 +7270,8 @@
         </p:nvSpPr>
         <p:spPr>
           <a:xfrm>
-            <a:off x="7546235" y="847165"/>
-            <a:ext cx="4341044" cy="1200329"/>
+            <a:off x="1206630" y="5854045"/>
+            <a:ext cx="9549354" cy="584775"/>
           </a:xfrm>
           <a:prstGeom prst="rect">
             <a:avLst/>
@@ -7248,220 +7285,8 @@
           <a:lstStyle/>
           <a:p>
             <a:r>
-              <a:rPr lang="en-US" sz="2000" dirty="0"/>
-              <a:t>Different US News and World Report Best College Regions 2016 have different graduation rates  </a:t>
-            </a:r>
-          </a:p>
-          <a:p>
-            <a:r>
-              <a:rPr lang="en-US" sz="1000" dirty="0"/>
-              <a:t>( ANOVA  p-value= 0.0, </a:t>
-            </a:r>
-            <a:r>
-              <a:rPr lang="en-US" sz="1000" dirty="0" err="1"/>
-              <a:t>fvalue</a:t>
-            </a:r>
-            <a:r>
-              <a:rPr lang="en-US" sz="1000" dirty="0"/>
-              <a:t>=47.13* ) </a:t>
-            </a:r>
-          </a:p>
-        </p:txBody>
-      </p:sp>
-      <p:sp>
-        <p:nvSpPr>
-          <p:cNvPr id="16" name="TextBox 15">
-            <a:extLst>
-              <a:ext uri="{FF2B5EF4-FFF2-40B4-BE49-F238E27FC236}">
-                <a16:creationId xmlns:a16="http://schemas.microsoft.com/office/drawing/2014/main" id="{B0A3509E-C7E1-D204-0521-08EF6D15925B}"/>
-              </a:ext>
-            </a:extLst>
-          </p:cNvPr>
-          <p:cNvSpPr txBox="1"/>
-          <p:nvPr/>
-        </p:nvSpPr>
-        <p:spPr>
-          <a:xfrm>
-            <a:off x="7546235" y="2068630"/>
-            <a:ext cx="4341044" cy="830997"/>
-          </a:xfrm>
-          <a:prstGeom prst="rect">
-            <a:avLst/>
-          </a:prstGeom>
-          <a:noFill/>
-        </p:spPr>
-        <p:txBody>
-          <a:bodyPr wrap="square" rtlCol="0">
-            <a:spAutoFit/>
-          </a:bodyPr>
-          <a:lstStyle/>
-          <a:p>
-            <a:r>
-              <a:rPr lang="en-US" dirty="0"/>
-              <a:t>The North Region does significantly better then even the next highest Midwest Region </a:t>
-            </a:r>
-          </a:p>
-          <a:p>
-            <a:r>
-              <a:rPr lang="en-US" sz="1000" dirty="0"/>
-              <a:t>( t-test p-value=0.0, statistic=5.8 *) </a:t>
-            </a:r>
-          </a:p>
-        </p:txBody>
-      </p:sp>
-      <p:sp>
-        <p:nvSpPr>
-          <p:cNvPr id="17" name="TextBox 16">
-            <a:extLst>
-              <a:ext uri="{FF2B5EF4-FFF2-40B4-BE49-F238E27FC236}">
-                <a16:creationId xmlns:a16="http://schemas.microsoft.com/office/drawing/2014/main" id="{86F68670-AA1C-18AA-9EB2-3BDAB6DFF876}"/>
-              </a:ext>
-            </a:extLst>
-          </p:cNvPr>
-          <p:cNvSpPr txBox="1"/>
-          <p:nvPr/>
-        </p:nvSpPr>
-        <p:spPr>
-          <a:xfrm>
-            <a:off x="7546235" y="3976144"/>
-            <a:ext cx="4341044" cy="830997"/>
-          </a:xfrm>
-          <a:prstGeom prst="rect">
-            <a:avLst/>
-          </a:prstGeom>
-          <a:noFill/>
-        </p:spPr>
-        <p:txBody>
-          <a:bodyPr wrap="square" rtlCol="0">
-            <a:spAutoFit/>
-          </a:bodyPr>
-          <a:lstStyle/>
-          <a:p>
-            <a:r>
-              <a:rPr lang="en-US" dirty="0"/>
-              <a:t>The Midwest does better than the West and South</a:t>
-            </a:r>
-          </a:p>
-          <a:p>
-            <a:r>
-              <a:rPr lang="en-US" sz="1000" dirty="0"/>
-              <a:t>( t-test p-value=0.002, statistic=3.02 *) </a:t>
-            </a:r>
-          </a:p>
-        </p:txBody>
-      </p:sp>
-      <p:sp>
-        <p:nvSpPr>
-          <p:cNvPr id="18" name="TextBox 17">
-            <a:extLst>
-              <a:ext uri="{FF2B5EF4-FFF2-40B4-BE49-F238E27FC236}">
-                <a16:creationId xmlns:a16="http://schemas.microsoft.com/office/drawing/2014/main" id="{5B2E507B-417F-74FF-5EB3-1BAA72E46EDE}"/>
-              </a:ext>
-            </a:extLst>
-          </p:cNvPr>
-          <p:cNvSpPr txBox="1"/>
-          <p:nvPr/>
-        </p:nvSpPr>
-        <p:spPr>
-          <a:xfrm>
-            <a:off x="9777167" y="6624138"/>
-            <a:ext cx="3455250" cy="276999"/>
-          </a:xfrm>
-          <a:prstGeom prst="rect">
-            <a:avLst/>
-          </a:prstGeom>
-          <a:noFill/>
-        </p:spPr>
-        <p:txBody>
-          <a:bodyPr wrap="square" rtlCol="0">
-            <a:spAutoFit/>
-          </a:bodyPr>
-          <a:lstStyle/>
-          <a:p>
-            <a:r>
-              <a:rPr lang="en-US" sz="1200" dirty="0"/>
-              <a:t>* p-values are exceedingly small</a:t>
-            </a:r>
-          </a:p>
-        </p:txBody>
-      </p:sp>
-      <p:sp>
-        <p:nvSpPr>
-          <p:cNvPr id="20" name="TextBox 19">
-            <a:extLst>
-              <a:ext uri="{FF2B5EF4-FFF2-40B4-BE49-F238E27FC236}">
-                <a16:creationId xmlns:a16="http://schemas.microsoft.com/office/drawing/2014/main" id="{FD9F5FB0-67BE-3F2B-7B6B-2CA24E92E315}"/>
-              </a:ext>
-            </a:extLst>
-          </p:cNvPr>
-          <p:cNvSpPr txBox="1"/>
-          <p:nvPr/>
-        </p:nvSpPr>
-        <p:spPr>
-          <a:xfrm>
-            <a:off x="7565756" y="3022387"/>
-            <a:ext cx="4422822" cy="830997"/>
-          </a:xfrm>
-          <a:prstGeom prst="rect">
-            <a:avLst/>
-          </a:prstGeom>
-          <a:noFill/>
-        </p:spPr>
-        <p:txBody>
-          <a:bodyPr wrap="square" rtlCol="0">
-            <a:spAutoFit/>
-          </a:bodyPr>
-          <a:lstStyle/>
-          <a:p>
-            <a:r>
-              <a:rPr lang="en-US" dirty="0"/>
-              <a:t>The West and South Region are not significantly better than each other</a:t>
-            </a:r>
-          </a:p>
-          <a:p>
-            <a:r>
-              <a:rPr lang="en-US" sz="1000" dirty="0"/>
-              <a:t>( t-test p-value=0.29, statistic=1.05 *) </a:t>
-            </a:r>
-          </a:p>
-        </p:txBody>
-      </p:sp>
-      <p:sp>
-        <p:nvSpPr>
-          <p:cNvPr id="21" name="TextBox 20">
-            <a:extLst>
-              <a:ext uri="{FF2B5EF4-FFF2-40B4-BE49-F238E27FC236}">
-                <a16:creationId xmlns:a16="http://schemas.microsoft.com/office/drawing/2014/main" id="{32F58916-7D38-07FD-436A-ABF2F7E9A3A3}"/>
-              </a:ext>
-            </a:extLst>
-          </p:cNvPr>
-          <p:cNvSpPr txBox="1"/>
-          <p:nvPr/>
-        </p:nvSpPr>
-        <p:spPr>
-          <a:xfrm>
-            <a:off x="7475613" y="5087506"/>
-            <a:ext cx="4341044" cy="954107"/>
-          </a:xfrm>
-          <a:prstGeom prst="rect">
-            <a:avLst/>
-          </a:prstGeom>
-          <a:noFill/>
-        </p:spPr>
-        <p:txBody>
-          <a:bodyPr wrap="square" rtlCol="0">
-            <a:spAutoFit/>
-          </a:bodyPr>
-          <a:lstStyle/>
-          <a:p>
-            <a:pPr algn="ctr"/>
-            <a:r>
-              <a:rPr lang="en-US" sz="2800" dirty="0">
-                <a:solidFill>
-                  <a:srgbClr val="35193E"/>
-                </a:solidFill>
-              </a:rPr>
-              <a:t>If you must graduate, attend North Region schools.</a:t>
+              <a:rPr lang="en-US" sz="3200" dirty="0"/>
+              <a:t>Spend More to get more? Graduation rates suggest yes.</a:t>
             </a:r>
           </a:p>
         </p:txBody>
@@ -7469,7 +7294,7 @@
     </p:spTree>
     <p:extLst>
       <p:ext uri="{BB962C8B-B14F-4D97-AF65-F5344CB8AC3E}">
-        <p14:creationId xmlns:p14="http://schemas.microsoft.com/office/powerpoint/2010/main" val="1096760155"/>
+        <p14:creationId xmlns:p14="http://schemas.microsoft.com/office/powerpoint/2010/main" val="2689969291"/>
       </p:ext>
     </p:extLst>
   </p:cSld>
@@ -7496,49 +7321,12 @@
           <a:chExt cx="0" cy="0"/>
         </a:xfrm>
       </p:grpSpPr>
-      <p:sp>
-        <p:nvSpPr>
-          <p:cNvPr id="2" name="Title 1">
-            <a:extLst>
-              <a:ext uri="{FF2B5EF4-FFF2-40B4-BE49-F238E27FC236}">
-                <a16:creationId xmlns:a16="http://schemas.microsoft.com/office/drawing/2014/main" id="{94866483-6B02-5DAF-0C50-C4BED80A07BE}"/>
-              </a:ext>
-            </a:extLst>
-          </p:cNvPr>
-          <p:cNvSpPr>
-            <a:spLocks noGrp="1"/>
-          </p:cNvSpPr>
-          <p:nvPr>
-            <p:ph type="title"/>
-          </p:nvPr>
-        </p:nvSpPr>
-        <p:spPr>
-          <a:xfrm>
-            <a:off x="358220" y="1"/>
-            <a:ext cx="11833780" cy="1003954"/>
-          </a:xfrm>
-        </p:spPr>
-        <p:txBody>
-          <a:bodyPr/>
-          <a:lstStyle/>
-          <a:p>
-            <a:r>
-              <a:rPr lang="en-US" dirty="0">
-                <a:solidFill>
-                  <a:srgbClr val="701F57"/>
-                </a:solidFill>
-              </a:rPr>
-              <a:t>Graduation Rates: Tuition Up, Graduation Rate Up</a:t>
-            </a:r>
-          </a:p>
-        </p:txBody>
-      </p:sp>
       <p:pic>
         <p:nvPicPr>
-          <p:cNvPr id="5" name="Content Placeholder 4" descr="A graph of a graduation rate&#10;&#10;Description automatically generated">
-            <a:extLst>
-              <a:ext uri="{FF2B5EF4-FFF2-40B4-BE49-F238E27FC236}">
-                <a16:creationId xmlns:a16="http://schemas.microsoft.com/office/drawing/2014/main" id="{6194AAF0-4DC9-B6D9-DB20-8B109B0C1707}"/>
+          <p:cNvPr id="10" name="Content Placeholder 9" descr="A graph of a student to faculty ratio&#10;&#10;Description automatically generated">
+            <a:extLst>
+              <a:ext uri="{FF2B5EF4-FFF2-40B4-BE49-F238E27FC236}">
+                <a16:creationId xmlns:a16="http://schemas.microsoft.com/office/drawing/2014/main" id="{89D069B7-13D8-B031-BDF3-88017725CE5F}"/>
               </a:ext>
             </a:extLst>
           </p:cNvPr>
@@ -7557,130 +7345,6 @@
         </p:blipFill>
         <p:spPr>
           <a:xfrm>
-            <a:off x="109326" y="1163498"/>
-            <a:ext cx="6041337" cy="4531003"/>
-          </a:xfrm>
-        </p:spPr>
-      </p:pic>
-      <p:pic>
-        <p:nvPicPr>
-          <p:cNvPr id="9" name="Picture 8" descr="A graph of a graduation rate&#10;&#10;Description automatically generated">
-            <a:extLst>
-              <a:ext uri="{FF2B5EF4-FFF2-40B4-BE49-F238E27FC236}">
-                <a16:creationId xmlns:a16="http://schemas.microsoft.com/office/drawing/2014/main" id="{3164DDFE-5165-7557-4E91-EF7158921E4B}"/>
-              </a:ext>
-            </a:extLst>
-          </p:cNvPr>
-          <p:cNvPicPr>
-            <a:picLocks noChangeAspect="1"/>
-          </p:cNvPicPr>
-          <p:nvPr/>
-        </p:nvPicPr>
-        <p:blipFill>
-          <a:blip r:embed="rId3"/>
-          <a:stretch>
-            <a:fillRect/>
-          </a:stretch>
-        </p:blipFill>
-        <p:spPr>
-          <a:xfrm>
-            <a:off x="6150663" y="1163498"/>
-            <a:ext cx="6041337" cy="4531003"/>
-          </a:xfrm>
-          <a:prstGeom prst="rect">
-            <a:avLst/>
-          </a:prstGeom>
-        </p:spPr>
-      </p:pic>
-      <p:sp>
-        <p:nvSpPr>
-          <p:cNvPr id="10" name="TextBox 9">
-            <a:extLst>
-              <a:ext uri="{FF2B5EF4-FFF2-40B4-BE49-F238E27FC236}">
-                <a16:creationId xmlns:a16="http://schemas.microsoft.com/office/drawing/2014/main" id="{1BC07490-E4DC-47B5-A06C-4BB206139128}"/>
-              </a:ext>
-            </a:extLst>
-          </p:cNvPr>
-          <p:cNvSpPr txBox="1"/>
-          <p:nvPr/>
-        </p:nvSpPr>
-        <p:spPr>
-          <a:xfrm>
-            <a:off x="1206630" y="5854045"/>
-            <a:ext cx="9549354" cy="584775"/>
-          </a:xfrm>
-          <a:prstGeom prst="rect">
-            <a:avLst/>
-          </a:prstGeom>
-          <a:noFill/>
-        </p:spPr>
-        <p:txBody>
-          <a:bodyPr wrap="square" rtlCol="0">
-            <a:spAutoFit/>
-          </a:bodyPr>
-          <a:lstStyle/>
-          <a:p>
-            <a:r>
-              <a:rPr lang="en-US" sz="3200" dirty="0"/>
-              <a:t>Spend More to get more? Graduation rates suggest yes.</a:t>
-            </a:r>
-          </a:p>
-        </p:txBody>
-      </p:sp>
-    </p:spTree>
-    <p:extLst>
-      <p:ext uri="{BB962C8B-B14F-4D97-AF65-F5344CB8AC3E}">
-        <p14:creationId xmlns:p14="http://schemas.microsoft.com/office/powerpoint/2010/main" val="2689969291"/>
-      </p:ext>
-    </p:extLst>
-  </p:cSld>
-  <p:clrMapOvr>
-    <a:masterClrMapping/>
-  </p:clrMapOvr>
-</p:sld>
-</file>
-
-<file path=ppt/slides/slide23.xml><?xml version="1.0" encoding="utf-8"?>
-<p:sld xmlns:a="http://schemas.openxmlformats.org/drawingml/2006/main" xmlns:r="http://schemas.openxmlformats.org/officeDocument/2006/relationships" xmlns:p="http://schemas.openxmlformats.org/presentationml/2006/main">
-  <p:cSld>
-    <p:spTree>
-      <p:nvGrpSpPr>
-        <p:cNvPr id="1" name=""/>
-        <p:cNvGrpSpPr/>
-        <p:nvPr/>
-      </p:nvGrpSpPr>
-      <p:grpSpPr>
-        <a:xfrm>
-          <a:off x="0" y="0"/>
-          <a:ext cx="0" cy="0"/>
-          <a:chOff x="0" y="0"/>
-          <a:chExt cx="0" cy="0"/>
-        </a:xfrm>
-      </p:grpSpPr>
-      <p:pic>
-        <p:nvPicPr>
-          <p:cNvPr id="10" name="Content Placeholder 9" descr="A graph of a student to faculty ratio&#10;&#10;Description automatically generated">
-            <a:extLst>
-              <a:ext uri="{FF2B5EF4-FFF2-40B4-BE49-F238E27FC236}">
-                <a16:creationId xmlns:a16="http://schemas.microsoft.com/office/drawing/2014/main" id="{89D069B7-13D8-B031-BDF3-88017725CE5F}"/>
-              </a:ext>
-            </a:extLst>
-          </p:cNvPr>
-          <p:cNvPicPr>
-            <a:picLocks noGrp="1" noChangeAspect="1"/>
-          </p:cNvPicPr>
-          <p:nvPr>
-            <p:ph idx="1"/>
-          </p:nvPr>
-        </p:nvPicPr>
-        <p:blipFill>
-          <a:blip r:embed="rId2"/>
-          <a:stretch>
-            <a:fillRect/>
-          </a:stretch>
-        </p:blipFill>
-        <p:spPr>
-          <a:xfrm>
             <a:off x="165552" y="878886"/>
             <a:ext cx="7701917" cy="5776438"/>
           </a:xfrm>
@@ -7828,7 +7492,7 @@
 </p:sld>
 </file>
 
-<file path=ppt/slides/slide24.xml><?xml version="1.0" encoding="utf-8"?>
+<file path=ppt/slides/slide23.xml><?xml version="1.0" encoding="utf-8"?>
 <p:sld xmlns:a="http://schemas.openxmlformats.org/drawingml/2006/main" xmlns:r="http://schemas.openxmlformats.org/officeDocument/2006/relationships" xmlns:p="http://schemas.openxmlformats.org/presentationml/2006/main">
   <p:cSld>
     <p:bg>
@@ -10986,6 +10650,281 @@
 </p:sld>
 </file>
 
+<file path=ppt/slides/slide24.xml><?xml version="1.0" encoding="utf-8"?>
+<p:sld xmlns:a="http://schemas.openxmlformats.org/drawingml/2006/main" xmlns:r="http://schemas.openxmlformats.org/officeDocument/2006/relationships" xmlns:p="http://schemas.openxmlformats.org/presentationml/2006/main">
+  <p:cSld>
+    <p:spTree>
+      <p:nvGrpSpPr>
+        <p:cNvPr id="1" name=""/>
+        <p:cNvGrpSpPr/>
+        <p:nvPr/>
+      </p:nvGrpSpPr>
+      <p:grpSpPr>
+        <a:xfrm>
+          <a:off x="0" y="0"/>
+          <a:ext cx="0" cy="0"/>
+          <a:chOff x="0" y="0"/>
+          <a:chExt cx="0" cy="0"/>
+        </a:xfrm>
+      </p:grpSpPr>
+      <p:sp>
+        <p:nvSpPr>
+          <p:cNvPr id="2" name="Title 1">
+            <a:extLst>
+              <a:ext uri="{FF2B5EF4-FFF2-40B4-BE49-F238E27FC236}">
+                <a16:creationId xmlns:a16="http://schemas.microsoft.com/office/drawing/2014/main" id="{E206FE87-47DF-AB2C-AA36-23557084B825}"/>
+              </a:ext>
+            </a:extLst>
+          </p:cNvPr>
+          <p:cNvSpPr>
+            <a:spLocks noGrp="1"/>
+          </p:cNvSpPr>
+          <p:nvPr>
+            <p:ph type="title"/>
+          </p:nvPr>
+        </p:nvSpPr>
+        <p:spPr>
+          <a:xfrm>
+            <a:off x="0" y="86628"/>
+            <a:ext cx="10515600" cy="1325563"/>
+          </a:xfrm>
+        </p:spPr>
+        <p:txBody>
+          <a:bodyPr>
+            <a:normAutofit fontScale="90000"/>
+          </a:bodyPr>
+          <a:lstStyle/>
+          <a:p>
+            <a:r>
+              <a:rPr lang="en-US" dirty="0">
+                <a:solidFill>
+                  <a:srgbClr val="701F57"/>
+                </a:solidFill>
+              </a:rPr>
+              <a:t>PCA Dimension Reduction</a:t>
+            </a:r>
+            <a:br>
+              <a:rPr lang="en-US" dirty="0">
+                <a:solidFill>
+                  <a:srgbClr val="701F57"/>
+                </a:solidFill>
+              </a:rPr>
+            </a:br>
+            <a:r>
+              <a:rPr lang="en-US" sz="3100" dirty="0">
+                <a:solidFill>
+                  <a:srgbClr val="701F57"/>
+                </a:solidFill>
+              </a:rPr>
+              <a:t>The step before machine learning. </a:t>
+            </a:r>
+            <a:br>
+              <a:rPr lang="en-US" sz="3100" dirty="0">
+                <a:solidFill>
+                  <a:srgbClr val="701F57"/>
+                </a:solidFill>
+              </a:rPr>
+            </a:br>
+            <a:endParaRPr lang="en-US" sz="3100" dirty="0">
+              <a:solidFill>
+                <a:srgbClr val="701F57"/>
+              </a:solidFill>
+            </a:endParaRPr>
+          </a:p>
+        </p:txBody>
+      </p:sp>
+      <p:sp>
+        <p:nvSpPr>
+          <p:cNvPr id="3" name="Content Placeholder 2">
+            <a:extLst>
+              <a:ext uri="{FF2B5EF4-FFF2-40B4-BE49-F238E27FC236}">
+                <a16:creationId xmlns:a16="http://schemas.microsoft.com/office/drawing/2014/main" id="{7DE28176-1276-8F38-51D2-FCEE7207B0D4}"/>
+              </a:ext>
+            </a:extLst>
+          </p:cNvPr>
+          <p:cNvSpPr>
+            <a:spLocks noGrp="1"/>
+          </p:cNvSpPr>
+          <p:nvPr>
+            <p:ph idx="1"/>
+          </p:nvPr>
+        </p:nvSpPr>
+        <p:spPr>
+          <a:xfrm>
+            <a:off x="125930" y="1498819"/>
+            <a:ext cx="6137284" cy="5080685"/>
+          </a:xfrm>
+        </p:spPr>
+        <p:txBody>
+          <a:bodyPr>
+            <a:normAutofit/>
+          </a:bodyPr>
+          <a:lstStyle/>
+          <a:p>
+            <a:pPr marL="0" indent="0">
+              <a:buNone/>
+            </a:pPr>
+            <a:r>
+              <a:rPr lang="en-US" sz="3600" dirty="0">
+                <a:solidFill>
+                  <a:srgbClr val="35193E"/>
+                </a:solidFill>
+              </a:rPr>
+              <a:t>Preparation Work</a:t>
+            </a:r>
+          </a:p>
+          <a:p>
+            <a:pPr marL="0" indent="0">
+              <a:buNone/>
+            </a:pPr>
+            <a:r>
+              <a:rPr lang="en-US" sz="2000" dirty="0"/>
+              <a:t>Dropped Columns that were too unique</a:t>
+            </a:r>
+          </a:p>
+          <a:p>
+            <a:pPr lvl="1"/>
+            <a:r>
+              <a:rPr lang="en-CA" sz="1200" dirty="0">
+                <a:solidFill>
+                  <a:schemeClr val="tx1">
+                    <a:lumMod val="95000"/>
+                    <a:lumOff val="5000"/>
+                  </a:schemeClr>
+                </a:solidFill>
+              </a:rPr>
+              <a:t>A</a:t>
+            </a:r>
+            <a:r>
+              <a:rPr lang="en-CA" sz="1200" b="0" dirty="0">
+                <a:solidFill>
+                  <a:schemeClr val="tx1">
+                    <a:lumMod val="95000"/>
+                    <a:lumOff val="5000"/>
+                  </a:schemeClr>
+                </a:solidFill>
+                <a:effectLst/>
+              </a:rPr>
+              <a:t>ddress1, Address2, Latitude, Longitude, Zip Code, County.  Dropping Region as it was not part of the original data.</a:t>
+            </a:r>
+          </a:p>
+          <a:p>
+            <a:pPr lvl="1"/>
+            <a:r>
+              <a:rPr lang="en-CA" sz="1200" dirty="0">
+                <a:solidFill>
+                  <a:schemeClr val="tx1">
+                    <a:lumMod val="95000"/>
+                    <a:lumOff val="5000"/>
+                  </a:schemeClr>
+                </a:solidFill>
+              </a:rPr>
+              <a:t>Reduction from over 3000 columns hot-encoded to just 68</a:t>
+            </a:r>
+            <a:endParaRPr lang="en-US" sz="2000" dirty="0">
+              <a:solidFill>
+                <a:srgbClr val="35193E"/>
+              </a:solidFill>
+            </a:endParaRPr>
+          </a:p>
+          <a:p>
+            <a:pPr marL="0" indent="0">
+              <a:buNone/>
+            </a:pPr>
+            <a:r>
+              <a:rPr lang="en-US" sz="2000" dirty="0">
+                <a:solidFill>
+                  <a:srgbClr val="35193E"/>
+                </a:solidFill>
+              </a:rPr>
+              <a:t>Hot-Encoding data VIA Pandas </a:t>
+            </a:r>
+            <a:r>
+              <a:rPr lang="en-US" sz="2000" dirty="0" err="1">
+                <a:solidFill>
+                  <a:srgbClr val="35193E"/>
+                </a:solidFill>
+              </a:rPr>
+              <a:t>pd.get_dummies</a:t>
+            </a:r>
+            <a:r>
+              <a:rPr lang="en-US" sz="2000" dirty="0">
+                <a:solidFill>
+                  <a:srgbClr val="35193E"/>
+                </a:solidFill>
+              </a:rPr>
+              <a:t>. </a:t>
+            </a:r>
+          </a:p>
+          <a:p>
+            <a:pPr marL="0" indent="0">
+              <a:buNone/>
+            </a:pPr>
+            <a:r>
+              <a:rPr lang="en-US" sz="2000" dirty="0"/>
+              <a:t>Imputing missing data via Median Strategy.</a:t>
+            </a:r>
+          </a:p>
+          <a:p>
+            <a:pPr marL="0" indent="0">
+              <a:buNone/>
+            </a:pPr>
+            <a:r>
+              <a:rPr lang="en-US" sz="2000" dirty="0"/>
+              <a:t>Scaling via Standard Scalar Modules</a:t>
+            </a:r>
+          </a:p>
+          <a:p>
+            <a:pPr marL="0" indent="0">
+              <a:buNone/>
+            </a:pPr>
+            <a:endParaRPr lang="en-US" dirty="0"/>
+          </a:p>
+        </p:txBody>
+      </p:sp>
+      <p:pic>
+        <p:nvPicPr>
+          <p:cNvPr id="7" name="Picture 6" descr="A screenshot of a computer program&#10;&#10;Description automatically generated">
+            <a:extLst>
+              <a:ext uri="{FF2B5EF4-FFF2-40B4-BE49-F238E27FC236}">
+                <a16:creationId xmlns:a16="http://schemas.microsoft.com/office/drawing/2014/main" id="{448E6F06-9CA2-8278-32BF-A24A74827367}"/>
+              </a:ext>
+            </a:extLst>
+          </p:cNvPr>
+          <p:cNvPicPr>
+            <a:picLocks noChangeAspect="1"/>
+          </p:cNvPicPr>
+          <p:nvPr/>
+        </p:nvPicPr>
+        <p:blipFill>
+          <a:blip r:embed="rId2"/>
+          <a:stretch>
+            <a:fillRect/>
+          </a:stretch>
+        </p:blipFill>
+        <p:spPr>
+          <a:xfrm>
+            <a:off x="6096000" y="0"/>
+            <a:ext cx="6634264" cy="6858000"/>
+          </a:xfrm>
+          <a:prstGeom prst="rect">
+            <a:avLst/>
+          </a:prstGeom>
+        </p:spPr>
+      </p:pic>
+    </p:spTree>
+    <p:extLst>
+      <p:ext uri="{BB962C8B-B14F-4D97-AF65-F5344CB8AC3E}">
+        <p14:creationId xmlns:p14="http://schemas.microsoft.com/office/powerpoint/2010/main" val="921451810"/>
+      </p:ext>
+    </p:extLst>
+  </p:cSld>
+  <p:clrMapOvr>
+    <a:masterClrMapping/>
+  </p:clrMapOvr>
+</p:sld>
+</file>
+
 <file path=ppt/slides/slide25.xml><?xml version="1.0" encoding="utf-8"?>
 <p:sld xmlns:a="http://schemas.openxmlformats.org/drawingml/2006/main" xmlns:r="http://schemas.openxmlformats.org/officeDocument/2006/relationships" xmlns:p="http://schemas.openxmlformats.org/presentationml/2006/main">
   <p:cSld>
@@ -11008,281 +10947,6 @@
           <p:cNvPr id="2" name="Title 1">
             <a:extLst>
               <a:ext uri="{FF2B5EF4-FFF2-40B4-BE49-F238E27FC236}">
-                <a16:creationId xmlns:a16="http://schemas.microsoft.com/office/drawing/2014/main" id="{E206FE87-47DF-AB2C-AA36-23557084B825}"/>
-              </a:ext>
-            </a:extLst>
-          </p:cNvPr>
-          <p:cNvSpPr>
-            <a:spLocks noGrp="1"/>
-          </p:cNvSpPr>
-          <p:nvPr>
-            <p:ph type="title"/>
-          </p:nvPr>
-        </p:nvSpPr>
-        <p:spPr>
-          <a:xfrm>
-            <a:off x="0" y="86628"/>
-            <a:ext cx="10515600" cy="1325563"/>
-          </a:xfrm>
-        </p:spPr>
-        <p:txBody>
-          <a:bodyPr>
-            <a:normAutofit fontScale="90000"/>
-          </a:bodyPr>
-          <a:lstStyle/>
-          <a:p>
-            <a:r>
-              <a:rPr lang="en-US" dirty="0">
-                <a:solidFill>
-                  <a:srgbClr val="701F57"/>
-                </a:solidFill>
-              </a:rPr>
-              <a:t>PCA Dimension Reduction</a:t>
-            </a:r>
-            <a:br>
-              <a:rPr lang="en-US" dirty="0">
-                <a:solidFill>
-                  <a:srgbClr val="701F57"/>
-                </a:solidFill>
-              </a:rPr>
-            </a:br>
-            <a:r>
-              <a:rPr lang="en-US" sz="3100" dirty="0">
-                <a:solidFill>
-                  <a:srgbClr val="701F57"/>
-                </a:solidFill>
-              </a:rPr>
-              <a:t>The step before machine learning. </a:t>
-            </a:r>
-            <a:br>
-              <a:rPr lang="en-US" sz="3100" dirty="0">
-                <a:solidFill>
-                  <a:srgbClr val="701F57"/>
-                </a:solidFill>
-              </a:rPr>
-            </a:br>
-            <a:endParaRPr lang="en-US" sz="3100" dirty="0">
-              <a:solidFill>
-                <a:srgbClr val="701F57"/>
-              </a:solidFill>
-            </a:endParaRPr>
-          </a:p>
-        </p:txBody>
-      </p:sp>
-      <p:sp>
-        <p:nvSpPr>
-          <p:cNvPr id="3" name="Content Placeholder 2">
-            <a:extLst>
-              <a:ext uri="{FF2B5EF4-FFF2-40B4-BE49-F238E27FC236}">
-                <a16:creationId xmlns:a16="http://schemas.microsoft.com/office/drawing/2014/main" id="{7DE28176-1276-8F38-51D2-FCEE7207B0D4}"/>
-              </a:ext>
-            </a:extLst>
-          </p:cNvPr>
-          <p:cNvSpPr>
-            <a:spLocks noGrp="1"/>
-          </p:cNvSpPr>
-          <p:nvPr>
-            <p:ph idx="1"/>
-          </p:nvPr>
-        </p:nvSpPr>
-        <p:spPr>
-          <a:xfrm>
-            <a:off x="125930" y="1498819"/>
-            <a:ext cx="6137284" cy="5080685"/>
-          </a:xfrm>
-        </p:spPr>
-        <p:txBody>
-          <a:bodyPr>
-            <a:normAutofit/>
-          </a:bodyPr>
-          <a:lstStyle/>
-          <a:p>
-            <a:pPr marL="0" indent="0">
-              <a:buNone/>
-            </a:pPr>
-            <a:r>
-              <a:rPr lang="en-US" sz="3600" dirty="0">
-                <a:solidFill>
-                  <a:srgbClr val="35193E"/>
-                </a:solidFill>
-              </a:rPr>
-              <a:t>Preparation Work</a:t>
-            </a:r>
-          </a:p>
-          <a:p>
-            <a:pPr marL="0" indent="0">
-              <a:buNone/>
-            </a:pPr>
-            <a:r>
-              <a:rPr lang="en-US" sz="2000" dirty="0"/>
-              <a:t>Dropped Columns that were too unique</a:t>
-            </a:r>
-          </a:p>
-          <a:p>
-            <a:pPr lvl="1"/>
-            <a:r>
-              <a:rPr lang="en-CA" sz="1200" dirty="0">
-                <a:solidFill>
-                  <a:schemeClr val="tx1">
-                    <a:lumMod val="95000"/>
-                    <a:lumOff val="5000"/>
-                  </a:schemeClr>
-                </a:solidFill>
-              </a:rPr>
-              <a:t>A</a:t>
-            </a:r>
-            <a:r>
-              <a:rPr lang="en-CA" sz="1200" b="0" dirty="0">
-                <a:solidFill>
-                  <a:schemeClr val="tx1">
-                    <a:lumMod val="95000"/>
-                    <a:lumOff val="5000"/>
-                  </a:schemeClr>
-                </a:solidFill>
-                <a:effectLst/>
-              </a:rPr>
-              <a:t>ddress1, Address2, Latitude, Longitude, Zip Code, County.  Dropping Region as it was not part of the original data.</a:t>
-            </a:r>
-          </a:p>
-          <a:p>
-            <a:pPr lvl="1"/>
-            <a:r>
-              <a:rPr lang="en-CA" sz="1200" dirty="0">
-                <a:solidFill>
-                  <a:schemeClr val="tx1">
-                    <a:lumMod val="95000"/>
-                    <a:lumOff val="5000"/>
-                  </a:schemeClr>
-                </a:solidFill>
-              </a:rPr>
-              <a:t>Reduction from over 3000 columns hot-encoded to just 68</a:t>
-            </a:r>
-            <a:endParaRPr lang="en-US" sz="2000" dirty="0">
-              <a:solidFill>
-                <a:srgbClr val="35193E"/>
-              </a:solidFill>
-            </a:endParaRPr>
-          </a:p>
-          <a:p>
-            <a:pPr marL="0" indent="0">
-              <a:buNone/>
-            </a:pPr>
-            <a:r>
-              <a:rPr lang="en-US" sz="2000" dirty="0">
-                <a:solidFill>
-                  <a:srgbClr val="35193E"/>
-                </a:solidFill>
-              </a:rPr>
-              <a:t>Hot-Encoding data VIA Pandas </a:t>
-            </a:r>
-            <a:r>
-              <a:rPr lang="en-US" sz="2000" dirty="0" err="1">
-                <a:solidFill>
-                  <a:srgbClr val="35193E"/>
-                </a:solidFill>
-              </a:rPr>
-              <a:t>pd.get_dummies</a:t>
-            </a:r>
-            <a:r>
-              <a:rPr lang="en-US" sz="2000" dirty="0">
-                <a:solidFill>
-                  <a:srgbClr val="35193E"/>
-                </a:solidFill>
-              </a:rPr>
-              <a:t>. </a:t>
-            </a:r>
-          </a:p>
-          <a:p>
-            <a:pPr marL="0" indent="0">
-              <a:buNone/>
-            </a:pPr>
-            <a:r>
-              <a:rPr lang="en-US" sz="2000" dirty="0"/>
-              <a:t>Imputing missing data via Median Strategy.</a:t>
-            </a:r>
-          </a:p>
-          <a:p>
-            <a:pPr marL="0" indent="0">
-              <a:buNone/>
-            </a:pPr>
-            <a:r>
-              <a:rPr lang="en-US" sz="2000" dirty="0"/>
-              <a:t>Scaling via Standard Scalar Modules</a:t>
-            </a:r>
-          </a:p>
-          <a:p>
-            <a:pPr marL="0" indent="0">
-              <a:buNone/>
-            </a:pPr>
-            <a:endParaRPr lang="en-US" dirty="0"/>
-          </a:p>
-        </p:txBody>
-      </p:sp>
-      <p:pic>
-        <p:nvPicPr>
-          <p:cNvPr id="7" name="Picture 6" descr="A screenshot of a computer program&#10;&#10;Description automatically generated">
-            <a:extLst>
-              <a:ext uri="{FF2B5EF4-FFF2-40B4-BE49-F238E27FC236}">
-                <a16:creationId xmlns:a16="http://schemas.microsoft.com/office/drawing/2014/main" id="{448E6F06-9CA2-8278-32BF-A24A74827367}"/>
-              </a:ext>
-            </a:extLst>
-          </p:cNvPr>
-          <p:cNvPicPr>
-            <a:picLocks noChangeAspect="1"/>
-          </p:cNvPicPr>
-          <p:nvPr/>
-        </p:nvPicPr>
-        <p:blipFill>
-          <a:blip r:embed="rId2"/>
-          <a:stretch>
-            <a:fillRect/>
-          </a:stretch>
-        </p:blipFill>
-        <p:spPr>
-          <a:xfrm>
-            <a:off x="6096000" y="0"/>
-            <a:ext cx="6634264" cy="6858000"/>
-          </a:xfrm>
-          <a:prstGeom prst="rect">
-            <a:avLst/>
-          </a:prstGeom>
-        </p:spPr>
-      </p:pic>
-    </p:spTree>
-    <p:extLst>
-      <p:ext uri="{BB962C8B-B14F-4D97-AF65-F5344CB8AC3E}">
-        <p14:creationId xmlns:p14="http://schemas.microsoft.com/office/powerpoint/2010/main" val="921451810"/>
-      </p:ext>
-    </p:extLst>
-  </p:cSld>
-  <p:clrMapOvr>
-    <a:masterClrMapping/>
-  </p:clrMapOvr>
-</p:sld>
-</file>
-
-<file path=ppt/slides/slide26.xml><?xml version="1.0" encoding="utf-8"?>
-<p:sld xmlns:a="http://schemas.openxmlformats.org/drawingml/2006/main" xmlns:r="http://schemas.openxmlformats.org/officeDocument/2006/relationships" xmlns:p="http://schemas.openxmlformats.org/presentationml/2006/main">
-  <p:cSld>
-    <p:spTree>
-      <p:nvGrpSpPr>
-        <p:cNvPr id="1" name=""/>
-        <p:cNvGrpSpPr/>
-        <p:nvPr/>
-      </p:nvGrpSpPr>
-      <p:grpSpPr>
-        <a:xfrm>
-          <a:off x="0" y="0"/>
-          <a:ext cx="0" cy="0"/>
-          <a:chOff x="0" y="0"/>
-          <a:chExt cx="0" cy="0"/>
-        </a:xfrm>
-      </p:grpSpPr>
-      <p:sp>
-        <p:nvSpPr>
-          <p:cNvPr id="2" name="Title 1">
-            <a:extLst>
-              <a:ext uri="{FF2B5EF4-FFF2-40B4-BE49-F238E27FC236}">
                 <a16:creationId xmlns:a16="http://schemas.microsoft.com/office/drawing/2014/main" id="{FA44683B-AB68-B853-DD01-7EA6203E9200}"/>
               </a:ext>
             </a:extLst>
@@ -11465,7 +11129,7 @@
 </p:sld>
 </file>
 
-<file path=ppt/slides/slide27.xml><?xml version="1.0" encoding="utf-8"?>
+<file path=ppt/slides/slide26.xml><?xml version="1.0" encoding="utf-8"?>
 <p:sld xmlns:a="http://schemas.openxmlformats.org/drawingml/2006/main" xmlns:r="http://schemas.openxmlformats.org/officeDocument/2006/relationships" xmlns:p="http://schemas.openxmlformats.org/presentationml/2006/main">
   <p:cSld>
     <p:spTree>

</xml_diff>